<commit_message>
Update and add more tables
</commit_message>
<xml_diff>
--- a/DOC/Fachgespraech.pptx
+++ b/DOC/Fachgespraech.pptx
@@ -5,10 +5,10 @@
     <p:sldMasterId id="2147483648" r:id="rId5"/>
   </p:sldMasterIdLst>
   <p:notesMasterIdLst>
-    <p:notesMasterId r:id="rId30"/>
+    <p:notesMasterId r:id="rId31"/>
   </p:notesMasterIdLst>
   <p:handoutMasterIdLst>
-    <p:handoutMasterId r:id="rId31"/>
+    <p:handoutMasterId r:id="rId32"/>
   </p:handoutMasterIdLst>
   <p:sldIdLst>
     <p:sldId id="329" r:id="rId6"/>
@@ -19,22 +19,23 @@
     <p:sldId id="476" r:id="rId11"/>
     <p:sldId id="475" r:id="rId12"/>
     <p:sldId id="477" r:id="rId13"/>
-    <p:sldId id="259" r:id="rId14"/>
-    <p:sldId id="261" r:id="rId15"/>
-    <p:sldId id="369" r:id="rId16"/>
-    <p:sldId id="356" r:id="rId17"/>
-    <p:sldId id="367" r:id="rId18"/>
-    <p:sldId id="370" r:id="rId19"/>
-    <p:sldId id="372" r:id="rId20"/>
-    <p:sldId id="373" r:id="rId21"/>
-    <p:sldId id="375" r:id="rId22"/>
-    <p:sldId id="374" r:id="rId23"/>
-    <p:sldId id="365" r:id="rId24"/>
-    <p:sldId id="366" r:id="rId25"/>
-    <p:sldId id="376" r:id="rId26"/>
-    <p:sldId id="378" r:id="rId27"/>
-    <p:sldId id="377" r:id="rId28"/>
-    <p:sldId id="348" r:id="rId29"/>
+    <p:sldId id="478" r:id="rId14"/>
+    <p:sldId id="259" r:id="rId15"/>
+    <p:sldId id="261" r:id="rId16"/>
+    <p:sldId id="369" r:id="rId17"/>
+    <p:sldId id="356" r:id="rId18"/>
+    <p:sldId id="367" r:id="rId19"/>
+    <p:sldId id="370" r:id="rId20"/>
+    <p:sldId id="372" r:id="rId21"/>
+    <p:sldId id="373" r:id="rId22"/>
+    <p:sldId id="375" r:id="rId23"/>
+    <p:sldId id="374" r:id="rId24"/>
+    <p:sldId id="365" r:id="rId25"/>
+    <p:sldId id="366" r:id="rId26"/>
+    <p:sldId id="376" r:id="rId27"/>
+    <p:sldId id="378" r:id="rId28"/>
+    <p:sldId id="377" r:id="rId29"/>
+    <p:sldId id="348" r:id="rId30"/>
   </p:sldIdLst>
   <p:sldSz cx="9144000" cy="6858000" type="screen4x3"/>
   <p:notesSz cx="7099300" cy="10234613"/>
@@ -163,7 +164,7 @@
 <file path=ppt/charts/chart1.xml><?xml version="1.0" encoding="utf-8"?>
 <c:chartSpace xmlns:c="http://schemas.openxmlformats.org/drawingml/2006/chart" xmlns:a="http://schemas.openxmlformats.org/drawingml/2006/main" xmlns:r="http://schemas.openxmlformats.org/officeDocument/2006/relationships" xmlns:c16r2="http://schemas.microsoft.com/office/drawing/2015/06/chart">
   <c:date1904 val="0"/>
-  <c:lang val="en-US"/>
+  <c:lang val="en-GB"/>
   <c:roundedCorners val="0"/>
   <mc:AlternateContent xmlns:mc="http://schemas.openxmlformats.org/markup-compatibility/2006">
     <mc:Choice xmlns:c14="http://schemas.microsoft.com/office/drawing/2007/8/2/chart" Requires="c14">
@@ -2132,7 +2133,7 @@
       </p:grpSpPr>
       <p:sp>
         <p:nvSpPr>
-          <p:cNvPr id="2" name="Slide Image Placeholder 1"/>
+          <p:cNvPr id="2" name="Folienbildplatzhalter 1"/>
           <p:cNvSpPr>
             <a:spLocks noGrp="1" noRot="1" noChangeAspect="1"/>
           </p:cNvSpPr>
@@ -2144,7 +2145,7 @@
       </p:sp>
       <p:sp>
         <p:nvSpPr>
-          <p:cNvPr id="3" name="Notes Placeholder 2"/>
+          <p:cNvPr id="3" name="Notizenplatzhalter 2"/>
           <p:cNvSpPr>
             <a:spLocks noGrp="1"/>
           </p:cNvSpPr>
@@ -2157,18 +2158,131 @@
           <a:bodyPr/>
           <a:lstStyle/>
           <a:p>
+            <a:r>
+              <a:rPr lang="de-DE" dirty="0"/>
+              <a:t>Um das zu erreichen, sollten bisher ungenutzte Features unserer WLAN-Appliance, der sog. IAC-BOX, aktiviert werden.</a:t>
+            </a:r>
+          </a:p>
+          <a:p>
+            <a:r>
+              <a:rPr lang="de-DE" dirty="0"/>
+              <a:t> </a:t>
+            </a:r>
+          </a:p>
+          <a:p>
+            <a:r>
+              <a:rPr lang="de-DE" dirty="0"/>
+              <a:t>Was genau ist die IAC-BOX? Die </a:t>
+            </a:r>
+            <a:r>
+              <a:rPr lang="de-DE" baseline="0" dirty="0"/>
+              <a:t>IAC-BOX implementiert ein Ticketsystem wie es auch z.B. Hotels verwenden. Die IAC-BOX wird auch an Hotels verkauft.</a:t>
+            </a:r>
             <a:endParaRPr lang="de-DE" dirty="0"/>
+          </a:p>
+          <a:p>
+            <a:endParaRPr lang="de-DE" dirty="0"/>
+          </a:p>
+          <a:p>
+            <a:r>
+              <a:rPr lang="de-DE" dirty="0"/>
+              <a:t>Sie hat die Aufgabe, den Zugang zum GESIS-Gästenetz zu verwalten.</a:t>
+            </a:r>
+          </a:p>
+          <a:p>
+            <a:endParaRPr lang="de-DE" dirty="0"/>
+          </a:p>
+          <a:p>
+            <a:r>
+              <a:rPr lang="de-DE" dirty="0"/>
+              <a:t>Dazu ist die IAC-BOX mit dem WLAN-Controller gekoppelt.</a:t>
+            </a:r>
+          </a:p>
+          <a:p>
+            <a:r>
+              <a:rPr lang="de-DE" dirty="0"/>
+              <a:t> </a:t>
+            </a:r>
+          </a:p>
+          <a:p>
+            <a:r>
+              <a:rPr lang="de-DE" dirty="0"/>
+              <a:t>Nur mit einem gültigen Ticket gestattet</a:t>
+            </a:r>
+            <a:r>
+              <a:rPr lang="de-DE" baseline="0" dirty="0"/>
+              <a:t> </a:t>
+            </a:r>
+            <a:r>
+              <a:rPr lang="de-DE" dirty="0"/>
+              <a:t>die IAC-BOX einem Gästegerät den Zugang zum Gästenetz.</a:t>
+            </a:r>
+          </a:p>
+          <a:p>
+            <a:r>
+              <a:rPr lang="de-DE" dirty="0"/>
+              <a:t> </a:t>
+            </a:r>
+          </a:p>
+          <a:p>
+            <a:r>
+              <a:rPr lang="de-DE" dirty="0"/>
+              <a:t>Diese</a:t>
+            </a:r>
+            <a:r>
+              <a:rPr lang="de-DE" baseline="0" dirty="0"/>
+              <a:t> </a:t>
+            </a:r>
+            <a:r>
+              <a:rPr lang="de-DE" dirty="0"/>
+              <a:t>Tickets wurden bisher</a:t>
+            </a:r>
+            <a:r>
+              <a:rPr lang="de-DE" baseline="0" dirty="0"/>
+              <a:t> </a:t>
+            </a:r>
+            <a:r>
+              <a:rPr lang="de-DE" dirty="0"/>
+              <a:t>von der IT erstellt.</a:t>
+            </a:r>
+          </a:p>
+          <a:p>
+            <a:r>
+              <a:rPr lang="de-DE" dirty="0"/>
+              <a:t> </a:t>
+            </a:r>
+          </a:p>
+          <a:p>
+            <a:r>
+              <a:rPr lang="de-DE" dirty="0"/>
+              <a:t>Um die IT von dieser Aufgabe zu befreien, sollte ich 5 bislang ungenutzte Module der IAC-BOX urbar machen.</a:t>
+            </a:r>
+          </a:p>
+          <a:p>
+            <a:endParaRPr lang="de-DE" dirty="0"/>
+          </a:p>
+          <a:p>
+            <a:r>
+              <a:rPr lang="de-DE" dirty="0"/>
+              <a:t> </a:t>
+            </a:r>
+          </a:p>
+          <a:p>
+            <a:r>
+              <a:rPr lang="de-DE" dirty="0"/>
+              <a:t>Ich werde im Folgenden diese Module genauer beschreiben.</a:t>
+            </a:r>
           </a:p>
         </p:txBody>
       </p:sp>
       <p:sp>
         <p:nvSpPr>
-          <p:cNvPr id="4" name="Date Placeholder 3"/>
+          <p:cNvPr id="4" name="Foliennummernplatzhalter 3"/>
           <p:cNvSpPr>
             <a:spLocks noGrp="1"/>
           </p:cNvSpPr>
           <p:nvPr>
-            <p:ph type="dt" idx="1"/>
+            <p:ph type="sldNum" sz="quarter" idx="10"/>
           </p:nvPr>
         </p:nvSpPr>
         <p:spPr/>
@@ -2176,28 +2290,8 @@
           <a:bodyPr/>
           <a:lstStyle/>
           <a:p>
-            <a:endParaRPr lang="de-DE"/>
-          </a:p>
-        </p:txBody>
-      </p:sp>
-      <p:sp>
-        <p:nvSpPr>
-          <p:cNvPr id="5" name="Slide Number Placeholder 4"/>
-          <p:cNvSpPr>
-            <a:spLocks noGrp="1"/>
-          </p:cNvSpPr>
-          <p:nvPr>
-            <p:ph type="sldNum" sz="quarter" idx="5"/>
-          </p:nvPr>
-        </p:nvSpPr>
-        <p:spPr/>
-        <p:txBody>
-          <a:bodyPr/>
-          <a:lstStyle/>
-          <a:p>
-            <a:fld id="{BF63E930-8F88-4EE0-A623-E2193C3967E3}" type="slidenum">
+            <a:fld id="{1928C91E-B408-4609-AD83-03ADF00550DE}" type="slidenum">
               <a:rPr lang="de-DE" smtClean="0"/>
-              <a:pPr/>
               <a:t>11</a:t>
             </a:fld>
             <a:endParaRPr lang="de-DE"/>
@@ -2207,7 +2301,7 @@
     </p:spTree>
     <p:extLst>
       <p:ext uri="{BB962C8B-B14F-4D97-AF65-F5344CB8AC3E}">
-        <p14:creationId xmlns:p14="http://schemas.microsoft.com/office/powerpoint/2010/main" val="2774700447"/>
+        <p14:creationId xmlns:p14="http://schemas.microsoft.com/office/powerpoint/2010/main" val="2252166543"/>
       </p:ext>
     </p:extLst>
   </p:cSld>
@@ -2261,12 +2355,6 @@
           <a:bodyPr/>
           <a:lstStyle/>
           <a:p>
-            <a:r>
-              <a:rPr lang="de-DE" dirty="0"/>
-              <a:t>REFACTORING nicht im BILD</a:t>
-            </a:r>
-          </a:p>
-          <a:p>
             <a:endParaRPr lang="de-DE" dirty="0"/>
           </a:p>
         </p:txBody>
@@ -2286,7 +2374,7 @@
           <a:bodyPr/>
           <a:lstStyle/>
           <a:p>
-            <a:endParaRPr lang="de-DE" dirty="0"/>
+            <a:endParaRPr lang="de-DE"/>
           </a:p>
         </p:txBody>
       </p:sp>
@@ -2310,14 +2398,14 @@
               <a:pPr/>
               <a:t>12</a:t>
             </a:fld>
-            <a:endParaRPr lang="de-DE" dirty="0"/>
+            <a:endParaRPr lang="de-DE"/>
           </a:p>
         </p:txBody>
       </p:sp>
     </p:spTree>
     <p:extLst>
       <p:ext uri="{BB962C8B-B14F-4D97-AF65-F5344CB8AC3E}">
-        <p14:creationId xmlns:p14="http://schemas.microsoft.com/office/powerpoint/2010/main" val="1087693115"/>
+        <p14:creationId xmlns:p14="http://schemas.microsoft.com/office/powerpoint/2010/main" val="2774700447"/>
       </p:ext>
     </p:extLst>
   </p:cSld>
@@ -2346,7 +2434,7 @@
       </p:grpSpPr>
       <p:sp>
         <p:nvSpPr>
-          <p:cNvPr id="2" name="Folienbildplatzhalter 1"/>
+          <p:cNvPr id="2" name="Slide Image Placeholder 1"/>
           <p:cNvSpPr>
             <a:spLocks noGrp="1" noRot="1" noChangeAspect="1"/>
           </p:cNvSpPr>
@@ -2358,7 +2446,7 @@
       </p:sp>
       <p:sp>
         <p:nvSpPr>
-          <p:cNvPr id="3" name="Notizenplatzhalter 2"/>
+          <p:cNvPr id="3" name="Notes Placeholder 2"/>
           <p:cNvSpPr>
             <a:spLocks noGrp="1"/>
           </p:cNvSpPr>
@@ -2373,129 +2461,22 @@
           <a:p>
             <a:r>
               <a:rPr lang="de-DE" dirty="0"/>
-              <a:t>Um das zu erreichen, sollten bisher ungenutzte Features unserer WLAN-Appliance, der sog. IAC-BOX, aktiviert werden.</a:t>
-            </a:r>
-          </a:p>
-          <a:p>
-            <a:r>
-              <a:rPr lang="de-DE" dirty="0"/>
-              <a:t> </a:t>
-            </a:r>
-          </a:p>
-          <a:p>
-            <a:r>
-              <a:rPr lang="de-DE" dirty="0"/>
-              <a:t>Was genau ist die IAC-BOX? Die </a:t>
-            </a:r>
-            <a:r>
-              <a:rPr lang="de-DE" baseline="0" dirty="0"/>
-              <a:t>IAC-BOX implementiert ein Ticketsystem wie es auch z.B. Hotels verwenden. Die IAC-BOX wird auch an Hotels verkauft.</a:t>
-            </a:r>
+              <a:t>REFACTORING nicht im BILD</a:t>
+            </a:r>
+          </a:p>
+          <a:p>
             <a:endParaRPr lang="de-DE" dirty="0"/>
-          </a:p>
-          <a:p>
-            <a:endParaRPr lang="de-DE" dirty="0"/>
-          </a:p>
-          <a:p>
-            <a:r>
-              <a:rPr lang="de-DE" dirty="0"/>
-              <a:t>Sie hat die Aufgabe, den Zugang zum GESIS-Gästenetz zu verwalten.</a:t>
-            </a:r>
-          </a:p>
-          <a:p>
-            <a:endParaRPr lang="de-DE" dirty="0"/>
-          </a:p>
-          <a:p>
-            <a:r>
-              <a:rPr lang="de-DE" dirty="0"/>
-              <a:t>Dazu ist die IAC-BOX mit dem WLAN-Controller gekoppelt.</a:t>
-            </a:r>
-          </a:p>
-          <a:p>
-            <a:r>
-              <a:rPr lang="de-DE" dirty="0"/>
-              <a:t> </a:t>
-            </a:r>
-          </a:p>
-          <a:p>
-            <a:r>
-              <a:rPr lang="de-DE" dirty="0"/>
-              <a:t>Nur mit einem gültigen Ticket gestattet</a:t>
-            </a:r>
-            <a:r>
-              <a:rPr lang="de-DE" baseline="0" dirty="0"/>
-              <a:t> </a:t>
-            </a:r>
-            <a:r>
-              <a:rPr lang="de-DE" dirty="0"/>
-              <a:t>die IAC-BOX einem Gästegerät den Zugang zum Gästenetz.</a:t>
-            </a:r>
-          </a:p>
-          <a:p>
-            <a:r>
-              <a:rPr lang="de-DE" dirty="0"/>
-              <a:t> </a:t>
-            </a:r>
-          </a:p>
-          <a:p>
-            <a:r>
-              <a:rPr lang="de-DE" dirty="0"/>
-              <a:t>Diese</a:t>
-            </a:r>
-            <a:r>
-              <a:rPr lang="de-DE" baseline="0" dirty="0"/>
-              <a:t> </a:t>
-            </a:r>
-            <a:r>
-              <a:rPr lang="de-DE" dirty="0"/>
-              <a:t>Tickets wurden bisher</a:t>
-            </a:r>
-            <a:r>
-              <a:rPr lang="de-DE" baseline="0" dirty="0"/>
-              <a:t> </a:t>
-            </a:r>
-            <a:r>
-              <a:rPr lang="de-DE" dirty="0"/>
-              <a:t>von der IT erstellt.</a:t>
-            </a:r>
-          </a:p>
-          <a:p>
-            <a:r>
-              <a:rPr lang="de-DE" dirty="0"/>
-              <a:t> </a:t>
-            </a:r>
-          </a:p>
-          <a:p>
-            <a:r>
-              <a:rPr lang="de-DE" dirty="0"/>
-              <a:t>Um die IT von dieser Aufgabe zu befreien, sollte ich 5 bislang ungenutzte Module der IAC-BOX urbar machen.</a:t>
-            </a:r>
-          </a:p>
-          <a:p>
-            <a:endParaRPr lang="de-DE" dirty="0"/>
-          </a:p>
-          <a:p>
-            <a:r>
-              <a:rPr lang="de-DE" dirty="0"/>
-              <a:t> </a:t>
-            </a:r>
-          </a:p>
-          <a:p>
-            <a:r>
-              <a:rPr lang="de-DE" dirty="0"/>
-              <a:t>Ich werde im Folgenden diese Module genauer beschreiben.</a:t>
-            </a:r>
           </a:p>
         </p:txBody>
       </p:sp>
       <p:sp>
         <p:nvSpPr>
-          <p:cNvPr id="4" name="Foliennummernplatzhalter 3"/>
+          <p:cNvPr id="4" name="Date Placeholder 3"/>
           <p:cNvSpPr>
             <a:spLocks noGrp="1"/>
           </p:cNvSpPr>
           <p:nvPr>
-            <p:ph type="sldNum" sz="quarter" idx="10"/>
+            <p:ph type="dt" idx="1"/>
           </p:nvPr>
         </p:nvSpPr>
         <p:spPr/>
@@ -2503,18 +2484,38 @@
           <a:bodyPr/>
           <a:lstStyle/>
           <a:p>
-            <a:fld id="{1928C91E-B408-4609-AD83-03ADF00550DE}" type="slidenum">
+            <a:endParaRPr lang="de-DE" dirty="0"/>
+          </a:p>
+        </p:txBody>
+      </p:sp>
+      <p:sp>
+        <p:nvSpPr>
+          <p:cNvPr id="5" name="Slide Number Placeholder 4"/>
+          <p:cNvSpPr>
+            <a:spLocks noGrp="1"/>
+          </p:cNvSpPr>
+          <p:nvPr>
+            <p:ph type="sldNum" sz="quarter" idx="5"/>
+          </p:nvPr>
+        </p:nvSpPr>
+        <p:spPr/>
+        <p:txBody>
+          <a:bodyPr/>
+          <a:lstStyle/>
+          <a:p>
+            <a:fld id="{BF63E930-8F88-4EE0-A623-E2193C3967E3}" type="slidenum">
               <a:rPr lang="de-DE" smtClean="0"/>
-              <a:t>15</a:t>
+              <a:pPr/>
+              <a:t>13</a:t>
             </a:fld>
-            <a:endParaRPr lang="de-DE"/>
+            <a:endParaRPr lang="de-DE" dirty="0"/>
           </a:p>
         </p:txBody>
       </p:sp>
     </p:spTree>
     <p:extLst>
       <p:ext uri="{BB962C8B-B14F-4D97-AF65-F5344CB8AC3E}">
-        <p14:creationId xmlns:p14="http://schemas.microsoft.com/office/powerpoint/2010/main" val="4259533064"/>
+        <p14:creationId xmlns:p14="http://schemas.microsoft.com/office/powerpoint/2010/main" val="1087693115"/>
       </p:ext>
     </p:extLst>
   </p:cSld>
@@ -2711,7 +2712,7 @@
     </p:spTree>
     <p:extLst>
       <p:ext uri="{BB962C8B-B14F-4D97-AF65-F5344CB8AC3E}">
-        <p14:creationId xmlns:p14="http://schemas.microsoft.com/office/powerpoint/2010/main" val="2088475689"/>
+        <p14:creationId xmlns:p14="http://schemas.microsoft.com/office/powerpoint/2010/main" val="4259533064"/>
       </p:ext>
     </p:extLst>
   </p:cSld>
@@ -2740,7 +2741,7 @@
       </p:grpSpPr>
       <p:sp>
         <p:nvSpPr>
-          <p:cNvPr id="2" name="Slide Image Placeholder 1"/>
+          <p:cNvPr id="2" name="Folienbildplatzhalter 1"/>
           <p:cNvSpPr>
             <a:spLocks noGrp="1" noRot="1" noChangeAspect="1"/>
           </p:cNvSpPr>
@@ -2752,7 +2753,7 @@
       </p:sp>
       <p:sp>
         <p:nvSpPr>
-          <p:cNvPr id="3" name="Notes Placeholder 2"/>
+          <p:cNvPr id="3" name="Notizenplatzhalter 2"/>
           <p:cNvSpPr>
             <a:spLocks noGrp="1"/>
           </p:cNvSpPr>
@@ -2765,18 +2766,131 @@
           <a:bodyPr/>
           <a:lstStyle/>
           <a:p>
+            <a:r>
+              <a:rPr lang="de-DE" dirty="0"/>
+              <a:t>Um das zu erreichen, sollten bisher ungenutzte Features unserer WLAN-Appliance, der sog. IAC-BOX, aktiviert werden.</a:t>
+            </a:r>
+          </a:p>
+          <a:p>
+            <a:r>
+              <a:rPr lang="de-DE" dirty="0"/>
+              <a:t> </a:t>
+            </a:r>
+          </a:p>
+          <a:p>
+            <a:r>
+              <a:rPr lang="de-DE" dirty="0"/>
+              <a:t>Was genau ist die IAC-BOX? Die </a:t>
+            </a:r>
+            <a:r>
+              <a:rPr lang="de-DE" baseline="0" dirty="0"/>
+              <a:t>IAC-BOX implementiert ein Ticketsystem wie es auch z.B. Hotels verwenden. Die IAC-BOX wird auch an Hotels verkauft.</a:t>
+            </a:r>
             <a:endParaRPr lang="de-DE" dirty="0"/>
+          </a:p>
+          <a:p>
+            <a:endParaRPr lang="de-DE" dirty="0"/>
+          </a:p>
+          <a:p>
+            <a:r>
+              <a:rPr lang="de-DE" dirty="0"/>
+              <a:t>Sie hat die Aufgabe, den Zugang zum GESIS-Gästenetz zu verwalten.</a:t>
+            </a:r>
+          </a:p>
+          <a:p>
+            <a:endParaRPr lang="de-DE" dirty="0"/>
+          </a:p>
+          <a:p>
+            <a:r>
+              <a:rPr lang="de-DE" dirty="0"/>
+              <a:t>Dazu ist die IAC-BOX mit dem WLAN-Controller gekoppelt.</a:t>
+            </a:r>
+          </a:p>
+          <a:p>
+            <a:r>
+              <a:rPr lang="de-DE" dirty="0"/>
+              <a:t> </a:t>
+            </a:r>
+          </a:p>
+          <a:p>
+            <a:r>
+              <a:rPr lang="de-DE" dirty="0"/>
+              <a:t>Nur mit einem gültigen Ticket gestattet</a:t>
+            </a:r>
+            <a:r>
+              <a:rPr lang="de-DE" baseline="0" dirty="0"/>
+              <a:t> </a:t>
+            </a:r>
+            <a:r>
+              <a:rPr lang="de-DE" dirty="0"/>
+              <a:t>die IAC-BOX einem Gästegerät den Zugang zum Gästenetz.</a:t>
+            </a:r>
+          </a:p>
+          <a:p>
+            <a:r>
+              <a:rPr lang="de-DE" dirty="0"/>
+              <a:t> </a:t>
+            </a:r>
+          </a:p>
+          <a:p>
+            <a:r>
+              <a:rPr lang="de-DE" dirty="0"/>
+              <a:t>Diese</a:t>
+            </a:r>
+            <a:r>
+              <a:rPr lang="de-DE" baseline="0" dirty="0"/>
+              <a:t> </a:t>
+            </a:r>
+            <a:r>
+              <a:rPr lang="de-DE" dirty="0"/>
+              <a:t>Tickets wurden bisher</a:t>
+            </a:r>
+            <a:r>
+              <a:rPr lang="de-DE" baseline="0" dirty="0"/>
+              <a:t> </a:t>
+            </a:r>
+            <a:r>
+              <a:rPr lang="de-DE" dirty="0"/>
+              <a:t>von der IT erstellt.</a:t>
+            </a:r>
+          </a:p>
+          <a:p>
+            <a:r>
+              <a:rPr lang="de-DE" dirty="0"/>
+              <a:t> </a:t>
+            </a:r>
+          </a:p>
+          <a:p>
+            <a:r>
+              <a:rPr lang="de-DE" dirty="0"/>
+              <a:t>Um die IT von dieser Aufgabe zu befreien, sollte ich 5 bislang ungenutzte Module der IAC-BOX urbar machen.</a:t>
+            </a:r>
+          </a:p>
+          <a:p>
+            <a:endParaRPr lang="de-DE" dirty="0"/>
+          </a:p>
+          <a:p>
+            <a:r>
+              <a:rPr lang="de-DE" dirty="0"/>
+              <a:t> </a:t>
+            </a:r>
+          </a:p>
+          <a:p>
+            <a:r>
+              <a:rPr lang="de-DE" dirty="0"/>
+              <a:t>Ich werde im Folgenden diese Module genauer beschreiben.</a:t>
+            </a:r>
           </a:p>
         </p:txBody>
       </p:sp>
       <p:sp>
         <p:nvSpPr>
-          <p:cNvPr id="4" name="Date Placeholder 3"/>
+          <p:cNvPr id="4" name="Foliennummernplatzhalter 3"/>
           <p:cNvSpPr>
             <a:spLocks noGrp="1"/>
           </p:cNvSpPr>
           <p:nvPr>
-            <p:ph type="dt" idx="1"/>
+            <p:ph type="sldNum" sz="quarter" idx="10"/>
           </p:nvPr>
         </p:nvSpPr>
         <p:spPr/>
@@ -2784,29 +2898,9 @@
           <a:bodyPr/>
           <a:lstStyle/>
           <a:p>
-            <a:endParaRPr lang="de-DE"/>
-          </a:p>
-        </p:txBody>
-      </p:sp>
-      <p:sp>
-        <p:nvSpPr>
-          <p:cNvPr id="5" name="Slide Number Placeholder 4"/>
-          <p:cNvSpPr>
-            <a:spLocks noGrp="1"/>
-          </p:cNvSpPr>
-          <p:nvPr>
-            <p:ph type="sldNum" sz="quarter" idx="5"/>
-          </p:nvPr>
-        </p:nvSpPr>
-        <p:spPr/>
-        <p:txBody>
-          <a:bodyPr/>
-          <a:lstStyle/>
-          <a:p>
-            <a:fld id="{BF63E930-8F88-4EE0-A623-E2193C3967E3}" type="slidenum">
+            <a:fld id="{1928C91E-B408-4609-AD83-03ADF00550DE}" type="slidenum">
               <a:rPr lang="de-DE" smtClean="0"/>
-              <a:pPr/>
-              <a:t>19</a:t>
+              <a:t>17</a:t>
             </a:fld>
             <a:endParaRPr lang="de-DE"/>
           </a:p>
@@ -2815,7 +2909,7 @@
     </p:spTree>
     <p:extLst>
       <p:ext uri="{BB962C8B-B14F-4D97-AF65-F5344CB8AC3E}">
-        <p14:creationId xmlns:p14="http://schemas.microsoft.com/office/powerpoint/2010/main" val="1284332552"/>
+        <p14:creationId xmlns:p14="http://schemas.microsoft.com/office/powerpoint/2010/main" val="2088475689"/>
       </p:ext>
     </p:extLst>
   </p:cSld>
@@ -2869,10 +2963,7 @@
           <a:bodyPr/>
           <a:lstStyle/>
           <a:p>
-            <a:r>
-              <a:rPr lang="de-DE"/>
-              <a:t>ENTWICKLERDOKUMENTATION HAT ZEITLICH NICHT GEPASST UND WURDE VOM KUNDEN IM ABNAHMEPROTOKOLL NICHT ERWÄHNT.</a:t>
-            </a:r>
+            <a:endParaRPr lang="de-DE" dirty="0"/>
           </a:p>
         </p:txBody>
       </p:sp>
@@ -2913,7 +3004,114 @@
             <a:fld id="{BF63E930-8F88-4EE0-A623-E2193C3967E3}" type="slidenum">
               <a:rPr lang="de-DE" smtClean="0"/>
               <a:pPr/>
-              <a:t>22</a:t>
+              <a:t>20</a:t>
+            </a:fld>
+            <a:endParaRPr lang="de-DE"/>
+          </a:p>
+        </p:txBody>
+      </p:sp>
+    </p:spTree>
+    <p:extLst>
+      <p:ext uri="{BB962C8B-B14F-4D97-AF65-F5344CB8AC3E}">
+        <p14:creationId xmlns:p14="http://schemas.microsoft.com/office/powerpoint/2010/main" val="1284332552"/>
+      </p:ext>
+    </p:extLst>
+  </p:cSld>
+  <p:clrMapOvr>
+    <a:masterClrMapping/>
+  </p:clrMapOvr>
+</p:notes>
+</file>
+
+<file path=ppt/notesSlides/notesSlide16.xml><?xml version="1.0" encoding="utf-8"?>
+<p:notes xmlns:a="http://schemas.openxmlformats.org/drawingml/2006/main" xmlns:r="http://schemas.openxmlformats.org/officeDocument/2006/relationships" xmlns:p="http://schemas.openxmlformats.org/presentationml/2006/main">
+  <p:cSld>
+    <p:spTree>
+      <p:nvGrpSpPr>
+        <p:cNvPr id="1" name=""/>
+        <p:cNvGrpSpPr/>
+        <p:nvPr/>
+      </p:nvGrpSpPr>
+      <p:grpSpPr>
+        <a:xfrm>
+          <a:off x="0" y="0"/>
+          <a:ext cx="0" cy="0"/>
+          <a:chOff x="0" y="0"/>
+          <a:chExt cx="0" cy="0"/>
+        </a:xfrm>
+      </p:grpSpPr>
+      <p:sp>
+        <p:nvSpPr>
+          <p:cNvPr id="2" name="Slide Image Placeholder 1"/>
+          <p:cNvSpPr>
+            <a:spLocks noGrp="1" noRot="1" noChangeAspect="1"/>
+          </p:cNvSpPr>
+          <p:nvPr>
+            <p:ph type="sldImg"/>
+          </p:nvPr>
+        </p:nvSpPr>
+        <p:spPr/>
+      </p:sp>
+      <p:sp>
+        <p:nvSpPr>
+          <p:cNvPr id="3" name="Notes Placeholder 2"/>
+          <p:cNvSpPr>
+            <a:spLocks noGrp="1"/>
+          </p:cNvSpPr>
+          <p:nvPr>
+            <p:ph type="body" idx="1"/>
+          </p:nvPr>
+        </p:nvSpPr>
+        <p:spPr/>
+        <p:txBody>
+          <a:bodyPr/>
+          <a:lstStyle/>
+          <a:p>
+            <a:r>
+              <a:rPr lang="de-DE"/>
+              <a:t>ENTWICKLERDOKUMENTATION HAT ZEITLICH NICHT GEPASST UND WURDE VOM KUNDEN IM ABNAHMEPROTOKOLL NICHT ERWÄHNT.</a:t>
+            </a:r>
+          </a:p>
+        </p:txBody>
+      </p:sp>
+      <p:sp>
+        <p:nvSpPr>
+          <p:cNvPr id="4" name="Date Placeholder 3"/>
+          <p:cNvSpPr>
+            <a:spLocks noGrp="1"/>
+          </p:cNvSpPr>
+          <p:nvPr>
+            <p:ph type="dt" idx="1"/>
+          </p:nvPr>
+        </p:nvSpPr>
+        <p:spPr/>
+        <p:txBody>
+          <a:bodyPr/>
+          <a:lstStyle/>
+          <a:p>
+            <a:endParaRPr lang="de-DE"/>
+          </a:p>
+        </p:txBody>
+      </p:sp>
+      <p:sp>
+        <p:nvSpPr>
+          <p:cNvPr id="5" name="Slide Number Placeholder 4"/>
+          <p:cNvSpPr>
+            <a:spLocks noGrp="1"/>
+          </p:cNvSpPr>
+          <p:nvPr>
+            <p:ph type="sldNum" sz="quarter" idx="5"/>
+          </p:nvPr>
+        </p:nvSpPr>
+        <p:spPr/>
+        <p:txBody>
+          <a:bodyPr/>
+          <a:lstStyle/>
+          <a:p>
+            <a:fld id="{BF63E930-8F88-4EE0-A623-E2193C3967E3}" type="slidenum">
+              <a:rPr lang="de-DE" smtClean="0"/>
+              <a:pPr/>
+              <a:t>23</a:t>
             </a:fld>
             <a:endParaRPr lang="de-DE"/>
           </a:p>
@@ -3832,19 +4030,38 @@
       </p:grpSpPr>
       <p:sp>
         <p:nvSpPr>
-          <p:cNvPr id="2" name="Folienbildplatzhalter 1"/>
+          <p:cNvPr id="71682" name="Folienbildplatzhalter 1"/>
           <p:cNvSpPr>
-            <a:spLocks noGrp="1" noRot="1" noChangeAspect="1"/>
+            <a:spLocks noGrp="1" noRot="1" noChangeAspect="1" noTextEdit="1"/>
           </p:cNvSpPr>
           <p:nvPr>
             <p:ph type="sldImg"/>
           </p:nvPr>
         </p:nvSpPr>
-        <p:spPr/>
+        <p:spPr bwMode="auto">
+          <a:noFill/>
+          <a:ln>
+            <a:solidFill>
+              <a:srgbClr val="000000"/>
+            </a:solidFill>
+            <a:miter lim="800000"/>
+            <a:headEnd/>
+            <a:tailEnd/>
+          </a:ln>
+          <a:extLst>
+            <a:ext uri="{909E8E84-426E-40DD-AFC4-6F175D3DCCD1}">
+              <a14:hiddenFill xmlns:a14="http://schemas.microsoft.com/office/drawing/2010/main">
+                <a:solidFill>
+                  <a:srgbClr val="FFFFFF"/>
+                </a:solidFill>
+              </a14:hiddenFill>
+            </a:ext>
+          </a:extLst>
+        </p:spPr>
       </p:sp>
       <p:sp>
         <p:nvSpPr>
-          <p:cNvPr id="3" name="Notizenplatzhalter 2"/>
+          <p:cNvPr id="71683" name="Notizenplatzhalter 2"/>
           <p:cNvSpPr>
             <a:spLocks noGrp="1"/>
           </p:cNvSpPr>
@@ -3852,77 +4069,58 @@
             <p:ph type="body" idx="1"/>
           </p:nvPr>
         </p:nvSpPr>
-        <p:spPr/>
+        <p:spPr bwMode="auto">
+          <a:noFill/>
+          <a:extLst>
+            <a:ext uri="{909E8E84-426E-40DD-AFC4-6F175D3DCCD1}">
+              <a14:hiddenFill xmlns:a14="http://schemas.microsoft.com/office/drawing/2010/main">
+                <a:solidFill>
+                  <a:srgbClr val="FFFFFF"/>
+                </a:solidFill>
+              </a14:hiddenFill>
+            </a:ext>
+            <a:ext uri="{91240B29-F687-4F45-9708-019B960494DF}">
+              <a14:hiddenLine xmlns:a14="http://schemas.microsoft.com/office/drawing/2010/main" w="9525">
+                <a:solidFill>
+                  <a:srgbClr val="000000"/>
+                </a:solidFill>
+                <a:miter lim="800000"/>
+                <a:headEnd/>
+                <a:tailEnd/>
+              </a14:hiddenLine>
+            </a:ext>
+          </a:extLst>
+        </p:spPr>
         <p:txBody>
-          <a:bodyPr/>
+          <a:bodyPr wrap="square" numCol="1" anchor="t" anchorCtr="0" compatLnSpc="1">
+            <a:prstTxWarp prst="textNoShape">
+              <a:avLst/>
+            </a:prstTxWarp>
+          </a:bodyPr>
           <a:lstStyle/>
           <a:p>
             <a:r>
-              <a:rPr lang="de-DE" dirty="0"/>
-              <a:t>GESIS ist ein eingetragener Verein.</a:t>
-            </a:r>
-          </a:p>
-          <a:p>
-            <a:r>
-              <a:rPr lang="de-DE" dirty="0"/>
-              <a:t> </a:t>
-            </a:r>
-          </a:p>
-          <a:p>
-            <a:r>
-              <a:rPr lang="de-DE" dirty="0"/>
-              <a:t>Wir haben den Satzungszweck der Förderung der sozialwissenschaftlichen Forschung.</a:t>
-            </a:r>
-          </a:p>
-          <a:p>
-            <a:r>
-              <a:rPr lang="de-DE" dirty="0"/>
-              <a:t> </a:t>
-            </a:r>
-          </a:p>
-          <a:p>
-            <a:r>
-              <a:rPr lang="de-DE" dirty="0"/>
-              <a:t>Unser Ziel ist grundlegende, überregional und international bedeutsame forschungsbasierte Dienstleistungen für die Sozialwissenschaften zu erbringen. </a:t>
-            </a:r>
-          </a:p>
-          <a:p>
-            <a:r>
-              <a:rPr lang="de-DE" dirty="0"/>
-              <a:t> </a:t>
-            </a:r>
-          </a:p>
-          <a:p>
-            <a:r>
-              <a:rPr lang="de-DE" dirty="0"/>
-              <a:t>Wir haben zwei Standorte: Mannheim und Köln. Am Standort Köln arbeiten rund 300 Kolleginnen und Kollegen.</a:t>
-            </a:r>
-          </a:p>
-          <a:p>
-            <a:r>
-              <a:rPr lang="de-DE" dirty="0"/>
-              <a:t> </a:t>
-            </a:r>
-          </a:p>
-          <a:p>
-            <a:r>
-              <a:rPr lang="de-DE" dirty="0"/>
-              <a:t>Unter anderem richtet GESIS Schulungen, Seminare und Konferenzen aus. An Spitzentagen mit bis zu 250 Teilnehmern.</a:t>
-            </a:r>
-          </a:p>
-          <a:p>
-            <a:endParaRPr lang="de-DE" dirty="0"/>
+              <a:rPr lang="de-DE" altLang="de-DE" baseline="0" dirty="0" err="1"/>
+              <a:t>Gesis</a:t>
+            </a:r>
+            <a:r>
+              <a:rPr lang="de-DE" altLang="de-DE" baseline="0" dirty="0"/>
+              <a:t> Eingetragener Verein</a:t>
+            </a:r>
+          </a:p>
+          <a:p>
+            <a:endParaRPr lang="de-DE" altLang="de-DE" dirty="0"/>
           </a:p>
         </p:txBody>
       </p:sp>
       <p:sp>
         <p:nvSpPr>
-          <p:cNvPr id="4" name="Foliennummernplatzhalter 3"/>
+          <p:cNvPr id="5" name="Foliennummernplatzhalter 4"/>
           <p:cNvSpPr>
             <a:spLocks noGrp="1"/>
           </p:cNvSpPr>
           <p:nvPr>
-            <p:ph type="sldNum" sz="quarter" idx="10"/>
+            <p:ph type="sldNum" sz="quarter" idx="5"/>
           </p:nvPr>
         </p:nvSpPr>
         <p:spPr/>
@@ -3930,8 +4128,14 @@
           <a:bodyPr/>
           <a:lstStyle/>
           <a:p>
-            <a:fld id="{1928C91E-B408-4609-AD83-03ADF00550DE}" type="slidenum">
+            <a:pPr>
+              <a:defRPr/>
+            </a:pPr>
+            <a:fld id="{41850068-0579-4E26-98B5-C63652FAF565}" type="slidenum">
               <a:rPr lang="de-DE" smtClean="0"/>
+              <a:pPr>
+                <a:defRPr/>
+              </a:pPr>
               <a:t>9</a:t>
             </a:fld>
             <a:endParaRPr lang="de-DE"/>
@@ -3941,7 +4145,7 @@
     </p:spTree>
     <p:extLst>
       <p:ext uri="{BB962C8B-B14F-4D97-AF65-F5344CB8AC3E}">
-        <p14:creationId xmlns:p14="http://schemas.microsoft.com/office/powerpoint/2010/main" val="2003502434"/>
+        <p14:creationId xmlns:p14="http://schemas.microsoft.com/office/powerpoint/2010/main" val="3625378166"/>
       </p:ext>
     </p:extLst>
   </p:cSld>
@@ -3997,7 +4201,7 @@
           <a:p>
             <a:r>
               <a:rPr lang="de-DE" dirty="0"/>
-              <a:t>Um das zu erreichen, sollten bisher ungenutzte Features unserer WLAN-Appliance, der sog. IAC-BOX, aktiviert werden.</a:t>
+              <a:t>GESIS ist ein eingetragener Verein.</a:t>
             </a:r>
           </a:p>
           <a:p>
@@ -4009,30 +4213,7 @@
           <a:p>
             <a:r>
               <a:rPr lang="de-DE" dirty="0"/>
-              <a:t>Was genau ist die IAC-BOX? Die </a:t>
-            </a:r>
-            <a:r>
-              <a:rPr lang="de-DE" baseline="0" dirty="0"/>
-              <a:t>IAC-BOX implementiert ein Ticketsystem wie es auch z.B. Hotels verwenden. Die IAC-BOX wird auch an Hotels verkauft.</a:t>
-            </a:r>
-            <a:endParaRPr lang="de-DE" dirty="0"/>
-          </a:p>
-          <a:p>
-            <a:endParaRPr lang="de-DE" dirty="0"/>
-          </a:p>
-          <a:p>
-            <a:r>
-              <a:rPr lang="de-DE" dirty="0"/>
-              <a:t>Sie hat die Aufgabe, den Zugang zum GESIS-Gästenetz zu verwalten.</a:t>
-            </a:r>
-          </a:p>
-          <a:p>
-            <a:endParaRPr lang="de-DE" dirty="0"/>
-          </a:p>
-          <a:p>
-            <a:r>
-              <a:rPr lang="de-DE" dirty="0"/>
-              <a:t>Dazu ist die IAC-BOX mit dem WLAN-Controller gekoppelt.</a:t>
+              <a:t>Wir haben den Satzungszweck der Förderung der sozialwissenschaftlichen Forschung.</a:t>
             </a:r>
           </a:p>
           <a:p>
@@ -4044,15 +4225,7 @@
           <a:p>
             <a:r>
               <a:rPr lang="de-DE" dirty="0"/>
-              <a:t>Nur mit einem gültigen Ticket gestattet</a:t>
-            </a:r>
-            <a:r>
-              <a:rPr lang="de-DE" baseline="0" dirty="0"/>
-              <a:t> </a:t>
-            </a:r>
-            <a:r>
-              <a:rPr lang="de-DE" dirty="0"/>
-              <a:t>die IAC-BOX einem Gästegerät den Zugang zum Gästenetz.</a:t>
+              <a:t>Unser Ziel ist grundlegende, überregional und international bedeutsame forschungsbasierte Dienstleistungen für die Sozialwissenschaften zu erbringen. </a:t>
             </a:r>
           </a:p>
           <a:p>
@@ -4064,23 +4237,7 @@
           <a:p>
             <a:r>
               <a:rPr lang="de-DE" dirty="0"/>
-              <a:t>Diese</a:t>
-            </a:r>
-            <a:r>
-              <a:rPr lang="de-DE" baseline="0" dirty="0"/>
-              <a:t> </a:t>
-            </a:r>
-            <a:r>
-              <a:rPr lang="de-DE" dirty="0"/>
-              <a:t>Tickets wurden bisher</a:t>
-            </a:r>
-            <a:r>
-              <a:rPr lang="de-DE" baseline="0" dirty="0"/>
-              <a:t> </a:t>
-            </a:r>
-            <a:r>
-              <a:rPr lang="de-DE" dirty="0"/>
-              <a:t>von der IT erstellt.</a:t>
+              <a:t>Wir haben zwei Standorte: Mannheim und Köln. Am Standort Köln arbeiten rund 300 Kolleginnen und Kollegen.</a:t>
             </a:r>
           </a:p>
           <a:p>
@@ -4092,23 +4249,11 @@
           <a:p>
             <a:r>
               <a:rPr lang="de-DE" dirty="0"/>
-              <a:t>Um die IT von dieser Aufgabe zu befreien, sollte ich 5 bislang ungenutzte Module der IAC-BOX urbar machen.</a:t>
+              <a:t>Unter anderem richtet GESIS Schulungen, Seminare und Konferenzen aus. An Spitzentagen mit bis zu 250 Teilnehmern.</a:t>
             </a:r>
           </a:p>
           <a:p>
             <a:endParaRPr lang="de-DE" dirty="0"/>
-          </a:p>
-          <a:p>
-            <a:r>
-              <a:rPr lang="de-DE" dirty="0"/>
-              <a:t> </a:t>
-            </a:r>
-          </a:p>
-          <a:p>
-            <a:r>
-              <a:rPr lang="de-DE" dirty="0"/>
-              <a:t>Ich werde im Folgenden diese Module genauer beschreiben.</a:t>
-            </a:r>
           </a:p>
         </p:txBody>
       </p:sp>
@@ -4138,7 +4283,7 @@
     </p:spTree>
     <p:extLst>
       <p:ext uri="{BB962C8B-B14F-4D97-AF65-F5344CB8AC3E}">
-        <p14:creationId xmlns:p14="http://schemas.microsoft.com/office/powerpoint/2010/main" val="2252166543"/>
+        <p14:creationId xmlns:p14="http://schemas.microsoft.com/office/powerpoint/2010/main" val="2003502434"/>
       </p:ext>
     </p:extLst>
   </p:cSld>
@@ -6604,6 +6749,154 @@
         </p:nvSpPr>
         <p:spPr/>
         <p:txBody>
+          <a:bodyPr>
+            <a:normAutofit fontScale="90000"/>
+          </a:bodyPr>
+          <a:lstStyle/>
+          <a:p>
+            <a:r>
+              <a:rPr lang="de-DE" dirty="0"/>
+              <a:t>Projektumfeld - Das Institut</a:t>
+            </a:r>
+          </a:p>
+        </p:txBody>
+      </p:sp>
+      <p:sp>
+        <p:nvSpPr>
+          <p:cNvPr id="6" name="Rechteck 5"/>
+          <p:cNvSpPr/>
+          <p:nvPr/>
+        </p:nvSpPr>
+        <p:spPr>
+          <a:xfrm>
+            <a:off x="323528" y="6237312"/>
+            <a:ext cx="1440160" cy="620688"/>
+          </a:xfrm>
+          <a:prstGeom prst="rect">
+            <a:avLst/>
+          </a:prstGeom>
+          <a:ln>
+            <a:noFill/>
+          </a:ln>
+        </p:spPr>
+        <p:style>
+          <a:lnRef idx="2">
+            <a:schemeClr val="dk1"/>
+          </a:lnRef>
+          <a:fillRef idx="1">
+            <a:schemeClr val="lt1"/>
+          </a:fillRef>
+          <a:effectRef idx="0">
+            <a:schemeClr val="dk1"/>
+          </a:effectRef>
+          <a:fontRef idx="minor">
+            <a:schemeClr val="dk1"/>
+          </a:fontRef>
+        </p:style>
+        <p:txBody>
+          <a:bodyPr rtlCol="0" anchor="ctr"/>
+          <a:lstStyle/>
+          <a:p>
+            <a:pPr algn="ctr"/>
+            <a:endParaRPr lang="de-DE"/>
+          </a:p>
+        </p:txBody>
+      </p:sp>
+      <p:sp>
+        <p:nvSpPr>
+          <p:cNvPr id="7" name="Foliennummernplatzhalter 6"/>
+          <p:cNvSpPr>
+            <a:spLocks noGrp="1"/>
+          </p:cNvSpPr>
+          <p:nvPr>
+            <p:ph type="sldNum" sz="quarter" idx="12"/>
+          </p:nvPr>
+        </p:nvSpPr>
+        <p:spPr/>
+        <p:txBody>
+          <a:bodyPr/>
+          <a:lstStyle/>
+          <a:p>
+            <a:fld id="{AC76F9B2-121F-446C-A37F-B7F54BF3DCAC}" type="slidenum">
+              <a:rPr lang="de-DE" smtClean="0"/>
+              <a:t>10</a:t>
+            </a:fld>
+            <a:endParaRPr lang="de-DE" dirty="0"/>
+          </a:p>
+        </p:txBody>
+      </p:sp>
+      <p:pic>
+        <p:nvPicPr>
+          <p:cNvPr id="3" name="Picture 2">
+            <a:extLst>
+              <a:ext uri="{FF2B5EF4-FFF2-40B4-BE49-F238E27FC236}">
+                <a16:creationId xmlns:a16="http://schemas.microsoft.com/office/drawing/2014/main" id="{59164D2C-E2DF-EA48-8243-D028C4461300}"/>
+              </a:ext>
+            </a:extLst>
+          </p:cNvPr>
+          <p:cNvPicPr>
+            <a:picLocks noChangeAspect="1"/>
+          </p:cNvPicPr>
+          <p:nvPr/>
+        </p:nvPicPr>
+        <p:blipFill>
+          <a:blip r:embed="rId3"/>
+          <a:stretch>
+            <a:fillRect/>
+          </a:stretch>
+        </p:blipFill>
+        <p:spPr>
+          <a:xfrm>
+            <a:off x="1034412" y="1412197"/>
+            <a:ext cx="7075176" cy="5009917"/>
+          </a:xfrm>
+          <a:prstGeom prst="rect">
+            <a:avLst/>
+          </a:prstGeom>
+        </p:spPr>
+      </p:pic>
+    </p:spTree>
+    <p:extLst>
+      <p:ext uri="{BB962C8B-B14F-4D97-AF65-F5344CB8AC3E}">
+        <p14:creationId xmlns:p14="http://schemas.microsoft.com/office/powerpoint/2010/main" val="1457638166"/>
+      </p:ext>
+    </p:extLst>
+  </p:cSld>
+  <p:clrMapOvr>
+    <a:masterClrMapping/>
+  </p:clrMapOvr>
+</p:sld>
+</file>
+
+<file path=ppt/slides/slide11.xml><?xml version="1.0" encoding="utf-8"?>
+<p:sld xmlns:a="http://schemas.openxmlformats.org/drawingml/2006/main" xmlns:r="http://schemas.openxmlformats.org/officeDocument/2006/relationships" xmlns:p="http://schemas.openxmlformats.org/presentationml/2006/main">
+  <p:cSld>
+    <p:spTree>
+      <p:nvGrpSpPr>
+        <p:cNvPr id="1" name=""/>
+        <p:cNvGrpSpPr/>
+        <p:nvPr/>
+      </p:nvGrpSpPr>
+      <p:grpSpPr>
+        <a:xfrm>
+          <a:off x="0" y="0"/>
+          <a:ext cx="0" cy="0"/>
+          <a:chOff x="0" y="0"/>
+          <a:chExt cx="0" cy="0"/>
+        </a:xfrm>
+      </p:grpSpPr>
+      <p:sp>
+        <p:nvSpPr>
+          <p:cNvPr id="2" name="Titel 1"/>
+          <p:cNvSpPr>
+            <a:spLocks noGrp="1"/>
+          </p:cNvSpPr>
+          <p:nvPr>
+            <p:ph type="title"/>
+          </p:nvPr>
+        </p:nvSpPr>
+        <p:spPr/>
+        <p:txBody>
           <a:bodyPr/>
           <a:lstStyle/>
           <a:p>
@@ -6631,7 +6924,7 @@
           <a:p>
             <a:fld id="{AC76F9B2-121F-446C-A37F-B7F54BF3DCAC}" type="slidenum">
               <a:rPr lang="de-DE" smtClean="0"/>
-              <a:t>10</a:t>
+              <a:t>11</a:t>
             </a:fld>
             <a:endParaRPr lang="de-DE"/>
           </a:p>
@@ -7421,7 +7714,7 @@
 </p:sld>
 </file>
 
-<file path=ppt/slides/slide11.xml><?xml version="1.0" encoding="utf-8"?>
+<file path=ppt/slides/slide12.xml><?xml version="1.0" encoding="utf-8"?>
 <p:sld xmlns:a="http://schemas.openxmlformats.org/drawingml/2006/main" xmlns:r="http://schemas.openxmlformats.org/officeDocument/2006/relationships" xmlns:p="http://schemas.openxmlformats.org/presentationml/2006/main">
   <p:cSld>
     <p:spTree>
@@ -7519,7 +7812,7 @@
             <a:fld id="{506DEF79-D5F3-42ED-9335-D73AD216BB54}" type="slidenum">
               <a:rPr lang="de-DE" smtClean="0"/>
               <a:pPr/>
-              <a:t>11</a:t>
+              <a:t>12</a:t>
             </a:fld>
             <a:r>
               <a:rPr lang="de-DE"/>
@@ -7572,7 +7865,7 @@
 </p:sld>
 </file>
 
-<file path=ppt/slides/slide12.xml><?xml version="1.0" encoding="utf-8"?>
+<file path=ppt/slides/slide13.xml><?xml version="1.0" encoding="utf-8"?>
 <p:sld xmlns:a="http://schemas.openxmlformats.org/drawingml/2006/main" xmlns:r="http://schemas.openxmlformats.org/officeDocument/2006/relationships" xmlns:p="http://schemas.openxmlformats.org/presentationml/2006/main">
   <p:cSld>
     <p:spTree>
@@ -7678,7 +7971,7 @@
           <a:p>
             <a:fld id="{506DEF79-D5F3-42ED-9335-D73AD216BB54}" type="slidenum">
               <a:rPr lang="de-DE" smtClean="0"/>
-              <a:t>12</a:t>
+              <a:t>13</a:t>
             </a:fld>
             <a:r>
               <a:rPr lang="de-DE" dirty="0"/>
@@ -8039,7 +8332,7 @@
 </p:sld>
 </file>
 
-<file path=ppt/slides/slide13.xml><?xml version="1.0" encoding="utf-8"?>
+<file path=ppt/slides/slide14.xml><?xml version="1.0" encoding="utf-8"?>
 <p:sld xmlns:a="http://schemas.openxmlformats.org/drawingml/2006/main" xmlns:r="http://schemas.openxmlformats.org/officeDocument/2006/relationships" xmlns:p="http://schemas.openxmlformats.org/presentationml/2006/main">
   <p:cSld>
     <p:spTree>
@@ -8333,7 +8626,7 @@
             <a:fld id="{506DEF79-D5F3-42ED-9335-D73AD216BB54}" type="slidenum">
               <a:rPr lang="de-DE" smtClean="0"/>
               <a:pPr/>
-              <a:t>13</a:t>
+              <a:t>14</a:t>
             </a:fld>
             <a:r>
               <a:rPr lang="de-DE"/>
@@ -8355,7 +8648,7 @@
 </p:sld>
 </file>
 
-<file path=ppt/slides/slide14.xml><?xml version="1.0" encoding="utf-8"?>
+<file path=ppt/slides/slide15.xml><?xml version="1.0" encoding="utf-8"?>
 <p:sld xmlns:a="http://schemas.openxmlformats.org/drawingml/2006/main" xmlns:r="http://schemas.openxmlformats.org/officeDocument/2006/relationships" xmlns:p="http://schemas.openxmlformats.org/presentationml/2006/main">
   <p:cSld>
     <p:spTree>
@@ -9083,7 +9376,7 @@
             <a:fld id="{506DEF79-D5F3-42ED-9335-D73AD216BB54}" type="slidenum">
               <a:rPr lang="de-DE" smtClean="0"/>
               <a:pPr/>
-              <a:t>14</a:t>
+              <a:t>15</a:t>
             </a:fld>
             <a:r>
               <a:rPr lang="de-DE"/>
@@ -9307,7 +9600,7 @@
 </p:sld>
 </file>
 
-<file path=ppt/slides/slide15.xml><?xml version="1.0" encoding="utf-8"?>
+<file path=ppt/slides/slide16.xml><?xml version="1.0" encoding="utf-8"?>
 <p:sld xmlns:a="http://schemas.openxmlformats.org/drawingml/2006/main" xmlns:r="http://schemas.openxmlformats.org/officeDocument/2006/relationships" xmlns:p="http://schemas.openxmlformats.org/presentationml/2006/main">
   <p:cSld>
     <p:spTree>
@@ -9363,7 +9656,7 @@
           <a:p>
             <a:fld id="{AC76F9B2-121F-446C-A37F-B7F54BF3DCAC}" type="slidenum">
               <a:rPr lang="de-DE" smtClean="0"/>
-              <a:t>15</a:t>
+              <a:t>16</a:t>
             </a:fld>
             <a:endParaRPr lang="de-DE"/>
           </a:p>
@@ -10153,7 +10446,7 @@
 </p:sld>
 </file>
 
-<file path=ppt/slides/slide16.xml><?xml version="1.0" encoding="utf-8"?>
+<file path=ppt/slides/slide17.xml><?xml version="1.0" encoding="utf-8"?>
 <p:sld xmlns:a="http://schemas.openxmlformats.org/drawingml/2006/main" xmlns:r="http://schemas.openxmlformats.org/officeDocument/2006/relationships" xmlns:p="http://schemas.openxmlformats.org/presentationml/2006/main">
   <p:cSld>
     <p:spTree>
@@ -10209,7 +10502,7 @@
           <a:p>
             <a:fld id="{AC76F9B2-121F-446C-A37F-B7F54BF3DCAC}" type="slidenum">
               <a:rPr lang="de-DE" smtClean="0"/>
-              <a:t>16</a:t>
+              <a:t>17</a:t>
             </a:fld>
             <a:endParaRPr lang="de-DE"/>
           </a:p>
@@ -11179,7 +11472,7 @@
 </p:sld>
 </file>
 
-<file path=ppt/slides/slide17.xml><?xml version="1.0" encoding="utf-8"?>
+<file path=ppt/slides/slide18.xml><?xml version="1.0" encoding="utf-8"?>
 <p:sld xmlns:a="http://schemas.openxmlformats.org/drawingml/2006/main" xmlns:r="http://schemas.openxmlformats.org/officeDocument/2006/relationships" xmlns:p="http://schemas.openxmlformats.org/presentationml/2006/main">
   <p:cSld>
     <p:spTree>
@@ -11329,7 +11622,7 @@
             <a:fld id="{506DEF79-D5F3-42ED-9335-D73AD216BB54}" type="slidenum">
               <a:rPr lang="de-DE" smtClean="0"/>
               <a:pPr/>
-              <a:t>17</a:t>
+              <a:t>18</a:t>
             </a:fld>
             <a:r>
               <a:rPr lang="de-DE"/>
@@ -11549,7 +11842,7 @@
 </p:sld>
 </file>
 
-<file path=ppt/slides/slide18.xml><?xml version="1.0" encoding="utf-8"?>
+<file path=ppt/slides/slide19.xml><?xml version="1.0" encoding="utf-8"?>
 <p:sld xmlns:a="http://schemas.openxmlformats.org/drawingml/2006/main" xmlns:r="http://schemas.openxmlformats.org/officeDocument/2006/relationships" xmlns:p="http://schemas.openxmlformats.org/presentationml/2006/main">
   <p:cSld>
     <p:spTree>
@@ -11685,7 +11978,7 @@
             <a:fld id="{506DEF79-D5F3-42ED-9335-D73AD216BB54}" type="slidenum">
               <a:rPr lang="de-DE" smtClean="0"/>
               <a:pPr/>
-              <a:t>18</a:t>
+              <a:t>19</a:t>
             </a:fld>
             <a:r>
               <a:rPr lang="de-DE"/>
@@ -12371,7 +12664,201 @@
 </p:sld>
 </file>
 
-<file path=ppt/slides/slide19.xml><?xml version="1.0" encoding="utf-8"?>
+<file path=ppt/slides/slide2.xml><?xml version="1.0" encoding="utf-8"?>
+<p:sld xmlns:a="http://schemas.openxmlformats.org/drawingml/2006/main" xmlns:r="http://schemas.openxmlformats.org/officeDocument/2006/relationships" xmlns:p="http://schemas.openxmlformats.org/presentationml/2006/main">
+  <p:cSld>
+    <p:spTree>
+      <p:nvGrpSpPr>
+        <p:cNvPr id="1" name=""/>
+        <p:cNvGrpSpPr/>
+        <p:nvPr/>
+      </p:nvGrpSpPr>
+      <p:grpSpPr>
+        <a:xfrm>
+          <a:off x="0" y="0"/>
+          <a:ext cx="0" cy="0"/>
+          <a:chOff x="0" y="0"/>
+          <a:chExt cx="0" cy="0"/>
+        </a:xfrm>
+      </p:grpSpPr>
+      <p:sp>
+        <p:nvSpPr>
+          <p:cNvPr id="2" name="Title 1">
+            <a:extLst>
+              <a:ext uri="{FF2B5EF4-FFF2-40B4-BE49-F238E27FC236}">
+                <a16:creationId xmlns:a16="http://schemas.microsoft.com/office/drawing/2014/main" id="{F39A06CE-1991-C14C-8322-A489B36D6290}"/>
+              </a:ext>
+            </a:extLst>
+          </p:cNvPr>
+          <p:cNvSpPr>
+            <a:spLocks noGrp="1"/>
+          </p:cNvSpPr>
+          <p:nvPr>
+            <p:ph type="title"/>
+          </p:nvPr>
+        </p:nvSpPr>
+        <p:spPr/>
+        <p:txBody>
+          <a:bodyPr/>
+          <a:lstStyle/>
+          <a:p>
+            <a:r>
+              <a:rPr lang="de-DE" dirty="0"/>
+              <a:t>Agenda</a:t>
+            </a:r>
+          </a:p>
+        </p:txBody>
+      </p:sp>
+      <p:sp>
+        <p:nvSpPr>
+          <p:cNvPr id="3" name="Content Placeholder 2">
+            <a:extLst>
+              <a:ext uri="{FF2B5EF4-FFF2-40B4-BE49-F238E27FC236}">
+                <a16:creationId xmlns:a16="http://schemas.microsoft.com/office/drawing/2014/main" id="{9F0998FD-4570-294F-A998-33A0D82CBCD9}"/>
+              </a:ext>
+            </a:extLst>
+          </p:cNvPr>
+          <p:cNvSpPr>
+            <a:spLocks noGrp="1"/>
+          </p:cNvSpPr>
+          <p:nvPr>
+            <p:ph idx="1"/>
+          </p:nvPr>
+        </p:nvSpPr>
+        <p:spPr/>
+        <p:txBody>
+          <a:bodyPr/>
+          <a:lstStyle/>
+          <a:p>
+            <a:r>
+              <a:rPr lang="de-DE" dirty="0"/>
+              <a:t>Projektumfeld</a:t>
+            </a:r>
+          </a:p>
+          <a:p>
+            <a:r>
+              <a:rPr lang="de-DE" dirty="0"/>
+              <a:t>Projektbasis QES</a:t>
+            </a:r>
+          </a:p>
+          <a:p>
+            <a:r>
+              <a:rPr lang="de-DE" dirty="0"/>
+              <a:t>Planung</a:t>
+            </a:r>
+          </a:p>
+          <a:p>
+            <a:r>
+              <a:rPr lang="de-DE" dirty="0"/>
+              <a:t>Durchführung</a:t>
+            </a:r>
+          </a:p>
+          <a:p>
+            <a:r>
+              <a:rPr lang="de-DE" dirty="0"/>
+              <a:t>Qualitätssicherung</a:t>
+            </a:r>
+          </a:p>
+          <a:p>
+            <a:r>
+              <a:rPr lang="de-DE" dirty="0"/>
+              <a:t>Abnahme</a:t>
+            </a:r>
+          </a:p>
+          <a:p>
+            <a:r>
+              <a:rPr lang="de-DE" dirty="0"/>
+              <a:t>Fazit</a:t>
+            </a:r>
+          </a:p>
+          <a:p>
+            <a:r>
+              <a:rPr lang="de-DE" dirty="0"/>
+              <a:t>Ausblick</a:t>
+            </a:r>
+          </a:p>
+          <a:p>
+            <a:pPr marL="0" indent="0">
+              <a:buNone/>
+            </a:pPr>
+            <a:endParaRPr lang="de-DE" dirty="0"/>
+          </a:p>
+        </p:txBody>
+      </p:sp>
+      <p:sp>
+        <p:nvSpPr>
+          <p:cNvPr id="4" name="Footer Placeholder 3">
+            <a:extLst>
+              <a:ext uri="{FF2B5EF4-FFF2-40B4-BE49-F238E27FC236}">
+                <a16:creationId xmlns:a16="http://schemas.microsoft.com/office/drawing/2014/main" id="{E60A9312-8259-7049-AC8A-2207947A4FA2}"/>
+              </a:ext>
+            </a:extLst>
+          </p:cNvPr>
+          <p:cNvSpPr>
+            <a:spLocks noGrp="1"/>
+          </p:cNvSpPr>
+          <p:nvPr>
+            <p:ph type="ftr" sz="quarter" idx="11"/>
+          </p:nvPr>
+        </p:nvSpPr>
+        <p:spPr/>
+        <p:txBody>
+          <a:bodyPr/>
+          <a:lstStyle/>
+          <a:p>
+            <a:r>
+              <a:rPr lang="de-DE" dirty="0"/>
+              <a:t>Extreme Programming</a:t>
+            </a:r>
+          </a:p>
+        </p:txBody>
+      </p:sp>
+      <p:sp>
+        <p:nvSpPr>
+          <p:cNvPr id="5" name="Slide Number Placeholder 4">
+            <a:extLst>
+              <a:ext uri="{FF2B5EF4-FFF2-40B4-BE49-F238E27FC236}">
+                <a16:creationId xmlns:a16="http://schemas.microsoft.com/office/drawing/2014/main" id="{0BB0BD8B-109A-5C4A-8BD0-6F530B8711D4}"/>
+              </a:ext>
+            </a:extLst>
+          </p:cNvPr>
+          <p:cNvSpPr>
+            <a:spLocks noGrp="1"/>
+          </p:cNvSpPr>
+          <p:nvPr>
+            <p:ph type="sldNum" sz="quarter" idx="12"/>
+          </p:nvPr>
+        </p:nvSpPr>
+        <p:spPr/>
+        <p:txBody>
+          <a:bodyPr/>
+          <a:lstStyle/>
+          <a:p>
+            <a:fld id="{506DEF79-D5F3-42ED-9335-D73AD216BB54}" type="slidenum">
+              <a:rPr lang="de-DE" smtClean="0"/>
+              <a:t>2</a:t>
+            </a:fld>
+            <a:r>
+              <a:rPr lang="de-DE" dirty="0"/>
+              <a:t> von 16</a:t>
+            </a:r>
+          </a:p>
+        </p:txBody>
+      </p:sp>
+    </p:spTree>
+    <p:extLst>
+      <p:ext uri="{BB962C8B-B14F-4D97-AF65-F5344CB8AC3E}">
+        <p14:creationId xmlns:p14="http://schemas.microsoft.com/office/powerpoint/2010/main" val="3562765367"/>
+      </p:ext>
+    </p:extLst>
+  </p:cSld>
+  <p:clrMapOvr>
+    <a:masterClrMapping/>
+  </p:clrMapOvr>
+</p:sld>
+</file>
+
+<file path=ppt/slides/slide20.xml><?xml version="1.0" encoding="utf-8"?>
 <p:sld xmlns:a="http://schemas.openxmlformats.org/drawingml/2006/main" xmlns:r="http://schemas.openxmlformats.org/officeDocument/2006/relationships" xmlns:p="http://schemas.openxmlformats.org/presentationml/2006/main">
   <p:cSld>
     <p:spTree>
@@ -12508,7 +12995,7 @@
             <a:fld id="{506DEF79-D5F3-42ED-9335-D73AD216BB54}" type="slidenum">
               <a:rPr lang="de-DE" smtClean="0"/>
               <a:pPr/>
-              <a:t>19</a:t>
+              <a:t>20</a:t>
             </a:fld>
             <a:r>
               <a:rPr lang="de-DE"/>
@@ -12530,201 +13017,7 @@
 </p:sld>
 </file>
 
-<file path=ppt/slides/slide2.xml><?xml version="1.0" encoding="utf-8"?>
-<p:sld xmlns:a="http://schemas.openxmlformats.org/drawingml/2006/main" xmlns:r="http://schemas.openxmlformats.org/officeDocument/2006/relationships" xmlns:p="http://schemas.openxmlformats.org/presentationml/2006/main">
-  <p:cSld>
-    <p:spTree>
-      <p:nvGrpSpPr>
-        <p:cNvPr id="1" name=""/>
-        <p:cNvGrpSpPr/>
-        <p:nvPr/>
-      </p:nvGrpSpPr>
-      <p:grpSpPr>
-        <a:xfrm>
-          <a:off x="0" y="0"/>
-          <a:ext cx="0" cy="0"/>
-          <a:chOff x="0" y="0"/>
-          <a:chExt cx="0" cy="0"/>
-        </a:xfrm>
-      </p:grpSpPr>
-      <p:sp>
-        <p:nvSpPr>
-          <p:cNvPr id="2" name="Title 1">
-            <a:extLst>
-              <a:ext uri="{FF2B5EF4-FFF2-40B4-BE49-F238E27FC236}">
-                <a16:creationId xmlns:a16="http://schemas.microsoft.com/office/drawing/2014/main" id="{F39A06CE-1991-C14C-8322-A489B36D6290}"/>
-              </a:ext>
-            </a:extLst>
-          </p:cNvPr>
-          <p:cNvSpPr>
-            <a:spLocks noGrp="1"/>
-          </p:cNvSpPr>
-          <p:nvPr>
-            <p:ph type="title"/>
-          </p:nvPr>
-        </p:nvSpPr>
-        <p:spPr/>
-        <p:txBody>
-          <a:bodyPr/>
-          <a:lstStyle/>
-          <a:p>
-            <a:r>
-              <a:rPr lang="de-DE" dirty="0"/>
-              <a:t>Agenda</a:t>
-            </a:r>
-          </a:p>
-        </p:txBody>
-      </p:sp>
-      <p:sp>
-        <p:nvSpPr>
-          <p:cNvPr id="3" name="Content Placeholder 2">
-            <a:extLst>
-              <a:ext uri="{FF2B5EF4-FFF2-40B4-BE49-F238E27FC236}">
-                <a16:creationId xmlns:a16="http://schemas.microsoft.com/office/drawing/2014/main" id="{9F0998FD-4570-294F-A998-33A0D82CBCD9}"/>
-              </a:ext>
-            </a:extLst>
-          </p:cNvPr>
-          <p:cNvSpPr>
-            <a:spLocks noGrp="1"/>
-          </p:cNvSpPr>
-          <p:nvPr>
-            <p:ph idx="1"/>
-          </p:nvPr>
-        </p:nvSpPr>
-        <p:spPr/>
-        <p:txBody>
-          <a:bodyPr/>
-          <a:lstStyle/>
-          <a:p>
-            <a:r>
-              <a:rPr lang="de-DE" dirty="0"/>
-              <a:t>Projektumfeld</a:t>
-            </a:r>
-          </a:p>
-          <a:p>
-            <a:r>
-              <a:rPr lang="de-DE" dirty="0"/>
-              <a:t>Projektbasis QES</a:t>
-            </a:r>
-          </a:p>
-          <a:p>
-            <a:r>
-              <a:rPr lang="de-DE" dirty="0"/>
-              <a:t>Planung</a:t>
-            </a:r>
-          </a:p>
-          <a:p>
-            <a:r>
-              <a:rPr lang="de-DE" dirty="0"/>
-              <a:t>Durchführung</a:t>
-            </a:r>
-          </a:p>
-          <a:p>
-            <a:r>
-              <a:rPr lang="de-DE" dirty="0"/>
-              <a:t>Qualitätssicherung</a:t>
-            </a:r>
-          </a:p>
-          <a:p>
-            <a:r>
-              <a:rPr lang="de-DE" dirty="0"/>
-              <a:t>Abnahme</a:t>
-            </a:r>
-          </a:p>
-          <a:p>
-            <a:r>
-              <a:rPr lang="de-DE" dirty="0"/>
-              <a:t>Fazit</a:t>
-            </a:r>
-          </a:p>
-          <a:p>
-            <a:r>
-              <a:rPr lang="de-DE" dirty="0"/>
-              <a:t>Ausblick</a:t>
-            </a:r>
-          </a:p>
-          <a:p>
-            <a:pPr marL="0" indent="0">
-              <a:buNone/>
-            </a:pPr>
-            <a:endParaRPr lang="de-DE" dirty="0"/>
-          </a:p>
-        </p:txBody>
-      </p:sp>
-      <p:sp>
-        <p:nvSpPr>
-          <p:cNvPr id="4" name="Footer Placeholder 3">
-            <a:extLst>
-              <a:ext uri="{FF2B5EF4-FFF2-40B4-BE49-F238E27FC236}">
-                <a16:creationId xmlns:a16="http://schemas.microsoft.com/office/drawing/2014/main" id="{E60A9312-8259-7049-AC8A-2207947A4FA2}"/>
-              </a:ext>
-            </a:extLst>
-          </p:cNvPr>
-          <p:cNvSpPr>
-            <a:spLocks noGrp="1"/>
-          </p:cNvSpPr>
-          <p:nvPr>
-            <p:ph type="ftr" sz="quarter" idx="11"/>
-          </p:nvPr>
-        </p:nvSpPr>
-        <p:spPr/>
-        <p:txBody>
-          <a:bodyPr/>
-          <a:lstStyle/>
-          <a:p>
-            <a:r>
-              <a:rPr lang="de-DE" dirty="0"/>
-              <a:t>Extreme Programming</a:t>
-            </a:r>
-          </a:p>
-        </p:txBody>
-      </p:sp>
-      <p:sp>
-        <p:nvSpPr>
-          <p:cNvPr id="5" name="Slide Number Placeholder 4">
-            <a:extLst>
-              <a:ext uri="{FF2B5EF4-FFF2-40B4-BE49-F238E27FC236}">
-                <a16:creationId xmlns:a16="http://schemas.microsoft.com/office/drawing/2014/main" id="{0BB0BD8B-109A-5C4A-8BD0-6F530B8711D4}"/>
-              </a:ext>
-            </a:extLst>
-          </p:cNvPr>
-          <p:cNvSpPr>
-            <a:spLocks noGrp="1"/>
-          </p:cNvSpPr>
-          <p:nvPr>
-            <p:ph type="sldNum" sz="quarter" idx="12"/>
-          </p:nvPr>
-        </p:nvSpPr>
-        <p:spPr/>
-        <p:txBody>
-          <a:bodyPr/>
-          <a:lstStyle/>
-          <a:p>
-            <a:fld id="{506DEF79-D5F3-42ED-9335-D73AD216BB54}" type="slidenum">
-              <a:rPr lang="de-DE" smtClean="0"/>
-              <a:t>2</a:t>
-            </a:fld>
-            <a:r>
-              <a:rPr lang="de-DE" dirty="0"/>
-              <a:t> von 16</a:t>
-            </a:r>
-          </a:p>
-        </p:txBody>
-      </p:sp>
-    </p:spTree>
-    <p:extLst>
-      <p:ext uri="{BB962C8B-B14F-4D97-AF65-F5344CB8AC3E}">
-        <p14:creationId xmlns:p14="http://schemas.microsoft.com/office/powerpoint/2010/main" val="3562765367"/>
-      </p:ext>
-    </p:extLst>
-  </p:cSld>
-  <p:clrMapOvr>
-    <a:masterClrMapping/>
-  </p:clrMapOvr>
-</p:sld>
-</file>
-
-<file path=ppt/slides/slide20.xml><?xml version="1.0" encoding="utf-8"?>
+<file path=ppt/slides/slide21.xml><?xml version="1.0" encoding="utf-8"?>
 <p:sld xmlns:a="http://schemas.openxmlformats.org/drawingml/2006/main" xmlns:r="http://schemas.openxmlformats.org/officeDocument/2006/relationships" xmlns:p="http://schemas.openxmlformats.org/presentationml/2006/main">
   <p:cSld>
     <p:spTree>
@@ -12857,7 +13150,7 @@
             <a:fld id="{506DEF79-D5F3-42ED-9335-D73AD216BB54}" type="slidenum">
               <a:rPr lang="de-DE" smtClean="0"/>
               <a:pPr/>
-              <a:t>20</a:t>
+              <a:t>21</a:t>
             </a:fld>
             <a:r>
               <a:rPr lang="de-DE"/>
@@ -12879,7 +13172,7 @@
 </p:sld>
 </file>
 
-<file path=ppt/slides/slide21.xml><?xml version="1.0" encoding="utf-8"?>
+<file path=ppt/slides/slide22.xml><?xml version="1.0" encoding="utf-8"?>
 <p:sld xmlns:a="http://schemas.openxmlformats.org/drawingml/2006/main" xmlns:r="http://schemas.openxmlformats.org/officeDocument/2006/relationships" xmlns:p="http://schemas.openxmlformats.org/presentationml/2006/main">
   <p:cSld>
     <p:spTree>
@@ -13011,7 +13304,7 @@
             <a:fld id="{506DEF79-D5F3-42ED-9335-D73AD216BB54}" type="slidenum">
               <a:rPr lang="de-DE" smtClean="0"/>
               <a:pPr/>
-              <a:t>21</a:t>
+              <a:t>22</a:t>
             </a:fld>
             <a:r>
               <a:rPr lang="de-DE"/>
@@ -13034,7 +13327,7 @@
 </p:sld>
 </file>
 
-<file path=ppt/slides/slide22.xml><?xml version="1.0" encoding="utf-8"?>
+<file path=ppt/slides/slide23.xml><?xml version="1.0" encoding="utf-8"?>
 <p:sld xmlns:a="http://schemas.openxmlformats.org/drawingml/2006/main" xmlns:r="http://schemas.openxmlformats.org/officeDocument/2006/relationships" xmlns:p="http://schemas.openxmlformats.org/presentationml/2006/main">
   <p:cSld>
     <p:spTree>
@@ -13166,7 +13459,7 @@
             <a:fld id="{506DEF79-D5F3-42ED-9335-D73AD216BB54}" type="slidenum">
               <a:rPr lang="de-DE" smtClean="0"/>
               <a:pPr/>
-              <a:t>22</a:t>
+              <a:t>23</a:t>
             </a:fld>
             <a:r>
               <a:rPr lang="de-DE"/>
@@ -13189,7 +13482,7 @@
 </p:sld>
 </file>
 
-<file path=ppt/slides/slide23.xml><?xml version="1.0" encoding="utf-8"?>
+<file path=ppt/slides/slide24.xml><?xml version="1.0" encoding="utf-8"?>
 <p:sld xmlns:a="http://schemas.openxmlformats.org/drawingml/2006/main" xmlns:r="http://schemas.openxmlformats.org/officeDocument/2006/relationships" xmlns:p="http://schemas.openxmlformats.org/presentationml/2006/main">
   <p:cSld>
     <p:spTree>
@@ -13327,7 +13620,7 @@
             <a:fld id="{506DEF79-D5F3-42ED-9335-D73AD216BB54}" type="slidenum">
               <a:rPr lang="de-DE" smtClean="0"/>
               <a:pPr/>
-              <a:t>23</a:t>
+              <a:t>24</a:t>
             </a:fld>
             <a:r>
               <a:rPr lang="de-DE"/>
@@ -13350,7 +13643,7 @@
 </p:sld>
 </file>
 
-<file path=ppt/slides/slide24.xml><?xml version="1.0" encoding="utf-8"?>
+<file path=ppt/slides/slide25.xml><?xml version="1.0" encoding="utf-8"?>
 <p:sld xmlns:a="http://schemas.openxmlformats.org/drawingml/2006/main" xmlns:r="http://schemas.openxmlformats.org/officeDocument/2006/relationships" xmlns:p="http://schemas.openxmlformats.org/presentationml/2006/main">
   <p:cSld>
     <p:spTree>
@@ -18066,7 +18359,7 @@
               <a:rPr lang="de-DE" altLang="de-DE" sz="1200" dirty="0">
                 <a:latin typeface="Rotis SemiSans Pro" pitchFamily="50" charset="0"/>
               </a:rPr>
-              <a:t>Lösung</a:t>
+              <a:t>Dokumentation</a:t>
             </a:r>
           </a:p>
         </p:txBody>
@@ -18138,14 +18431,14 @@
           <p:nvPr>
             <p:extLst>
               <p:ext uri="{D42A27DB-BD31-4B8C-83A1-F6EECF244321}">
-                <p14:modId xmlns:p14="http://schemas.microsoft.com/office/powerpoint/2010/main" val="836299909"/>
+                <p14:modId xmlns:p14="http://schemas.microsoft.com/office/powerpoint/2010/main" val="3705082961"/>
               </p:ext>
             </p:extLst>
           </p:nvPr>
         </p:nvGraphicFramePr>
         <p:xfrm>
           <a:off x="2483774" y="1447994"/>
-          <a:ext cx="6530050" cy="2494280"/>
+          <a:ext cx="6530050" cy="2225040"/>
         </p:xfrm>
         <a:graphic>
           <a:graphicData uri="http://schemas.openxmlformats.org/drawingml/2006/table">
@@ -18196,65 +18489,100 @@
                     <a:bodyPr/>
                     <a:lstStyle/>
                     <a:p>
+                      <a:pPr algn="l" rtl="0" fontAlgn="ctr"/>
                       <a:r>
-                        <a:rPr lang="de-DE" dirty="0"/>
+                        <a:rPr lang="de-DE" sz="1800" b="1" i="0" u="none" strike="noStrike">
+                          <a:solidFill>
+                            <a:srgbClr val="FFFFFF"/>
+                          </a:solidFill>
+                          <a:effectLst/>
+                          <a:latin typeface="Calibri" panose="020F0502020204030204" pitchFamily="34" charset="0"/>
+                        </a:rPr>
                         <a:t>Kriterium</a:t>
                       </a:r>
                     </a:p>
                   </a:txBody>
-                  <a:tcPr/>
+                  <a:tcPr marL="9525" marR="9525" marT="9525" marB="0" anchor="ctr"/>
                 </a:tc>
                 <a:tc>
                   <a:txBody>
                     <a:bodyPr/>
                     <a:lstStyle/>
                     <a:p>
+                      <a:pPr algn="l" rtl="0" fontAlgn="ctr"/>
                       <a:r>
-                        <a:rPr lang="de-DE" dirty="0"/>
+                        <a:rPr lang="de-DE" sz="1800" b="1" i="0" u="none" strike="noStrike">
+                          <a:solidFill>
+                            <a:srgbClr val="FFFFFF"/>
+                          </a:solidFill>
+                          <a:effectLst/>
+                          <a:latin typeface="Calibri" panose="020F0502020204030204" pitchFamily="34" charset="0"/>
+                        </a:rPr>
                         <a:t>Faktor</a:t>
                       </a:r>
                     </a:p>
                   </a:txBody>
-                  <a:tcPr/>
+                  <a:tcPr marL="9525" marR="9525" marT="9525" marB="0" anchor="ctr"/>
                 </a:tc>
                 <a:tc>
                   <a:txBody>
                     <a:bodyPr/>
                     <a:lstStyle/>
                     <a:p>
+                      <a:pPr algn="l" rtl="0" fontAlgn="ctr"/>
                       <a:r>
-                        <a:rPr lang="de-DE" dirty="0"/>
+                        <a:rPr lang="de-DE" sz="1800" b="1" i="0" u="none" strike="noStrike">
+                          <a:solidFill>
+                            <a:srgbClr val="FFFFFF"/>
+                          </a:solidFill>
+                          <a:effectLst/>
+                          <a:latin typeface="Calibri" panose="020F0502020204030204" pitchFamily="34" charset="0"/>
+                        </a:rPr>
                         <a:t>Altes Verfahren</a:t>
                       </a:r>
                     </a:p>
                   </a:txBody>
-                  <a:tcPr/>
+                  <a:tcPr marL="9525" marR="9525" marT="9525" marB="0" anchor="ctr"/>
                 </a:tc>
                 <a:tc>
                   <a:txBody>
                     <a:bodyPr/>
                     <a:lstStyle/>
                     <a:p>
+                      <a:pPr algn="l" rtl="0" fontAlgn="ctr"/>
                       <a:r>
-                        <a:rPr lang="de-DE" dirty="0"/>
+                        <a:rPr lang="de-DE" sz="1800" b="1" i="0" u="none" strike="noStrike">
+                          <a:solidFill>
+                            <a:srgbClr val="FFFFFF"/>
+                          </a:solidFill>
+                          <a:effectLst/>
+                          <a:latin typeface="Calibri" panose="020F0502020204030204" pitchFamily="34" charset="0"/>
+                        </a:rPr>
                         <a:t>Qes</a:t>
                       </a:r>
                     </a:p>
                   </a:txBody>
-                  <a:tcPr/>
+                  <a:tcPr marL="9525" marR="9525" marT="9525" marB="0" anchor="ctr"/>
                 </a:tc>
                 <a:tc>
                   <a:txBody>
                     <a:bodyPr/>
                     <a:lstStyle/>
                     <a:p>
+                      <a:pPr algn="l" rtl="0" fontAlgn="ctr"/>
                       <a:r>
-                        <a:rPr lang="de-DE" dirty="0"/>
+                        <a:rPr lang="de-DE" sz="1800" b="1" i="0" u="none" strike="noStrike">
+                          <a:solidFill>
+                            <a:srgbClr val="FFFFFF"/>
+                          </a:solidFill>
+                          <a:effectLst/>
+                          <a:latin typeface="Calibri" panose="020F0502020204030204" pitchFamily="34" charset="0"/>
+                        </a:rPr>
                         <a:t>Qes mit Export</a:t>
                       </a:r>
                     </a:p>
                   </a:txBody>
-                  <a:tcPr/>
+                  <a:tcPr marL="9525" marR="9525" marT="9525" marB="0" anchor="ctr"/>
                 </a:tc>
                 <a:extLst>
                   <a:ext uri="{0D108BD9-81ED-4DB2-BD59-A6C34878D82A}">
@@ -18268,65 +18596,100 @@
                     <a:bodyPr/>
                     <a:lstStyle/>
                     <a:p>
+                      <a:pPr algn="l" rtl="0" fontAlgn="ctr"/>
                       <a:r>
-                        <a:rPr lang="de-DE" dirty="0"/>
+                        <a:rPr lang="de-DE" sz="1800" b="0" i="0" u="none" strike="noStrike">
+                          <a:solidFill>
+                            <a:srgbClr val="000000"/>
+                          </a:solidFill>
+                          <a:effectLst/>
+                          <a:latin typeface="Calibri" panose="020F0502020204030204" pitchFamily="34" charset="0"/>
+                        </a:rPr>
                         <a:t>Ergonomie</a:t>
                       </a:r>
                     </a:p>
                   </a:txBody>
-                  <a:tcPr/>
+                  <a:tcPr marL="9525" marR="9525" marT="9525" marB="0" anchor="ctr"/>
                 </a:tc>
                 <a:tc>
                   <a:txBody>
                     <a:bodyPr/>
                     <a:lstStyle/>
                     <a:p>
+                      <a:pPr algn="l" rtl="0" fontAlgn="ctr"/>
                       <a:r>
-                        <a:rPr lang="de-DE" dirty="0"/>
+                        <a:rPr lang="de-DE" sz="1800" b="0" i="0" u="none" strike="noStrike">
+                          <a:solidFill>
+                            <a:srgbClr val="000000"/>
+                          </a:solidFill>
+                          <a:effectLst/>
+                          <a:latin typeface="Calibri" panose="020F0502020204030204" pitchFamily="34" charset="0"/>
+                        </a:rPr>
                         <a:t>2</a:t>
                       </a:r>
                     </a:p>
                   </a:txBody>
-                  <a:tcPr/>
+                  <a:tcPr marL="9525" marR="9525" marT="9525" marB="0" anchor="ctr"/>
                 </a:tc>
                 <a:tc>
                   <a:txBody>
                     <a:bodyPr/>
                     <a:lstStyle/>
                     <a:p>
+                      <a:pPr algn="l" rtl="0" fontAlgn="ctr"/>
                       <a:r>
-                        <a:rPr lang="de-DE" dirty="0"/>
+                        <a:rPr lang="de-DE" sz="1800" b="0" i="0" u="none" strike="noStrike">
+                          <a:solidFill>
+                            <a:srgbClr val="000000"/>
+                          </a:solidFill>
+                          <a:effectLst/>
+                          <a:latin typeface="Calibri" panose="020F0502020204030204" pitchFamily="34" charset="0"/>
+                        </a:rPr>
                         <a:t>2</a:t>
                       </a:r>
                     </a:p>
                   </a:txBody>
-                  <a:tcPr/>
+                  <a:tcPr marL="9525" marR="9525" marT="9525" marB="0" anchor="ctr"/>
                 </a:tc>
                 <a:tc>
                   <a:txBody>
                     <a:bodyPr/>
                     <a:lstStyle/>
                     <a:p>
+                      <a:pPr algn="l" rtl="0" fontAlgn="ctr"/>
                       <a:r>
-                        <a:rPr lang="de-DE" dirty="0"/>
+                        <a:rPr lang="de-DE" sz="1800" b="0" i="0" u="none" strike="noStrike">
+                          <a:solidFill>
+                            <a:srgbClr val="000000"/>
+                          </a:solidFill>
+                          <a:effectLst/>
+                          <a:latin typeface="Calibri" panose="020F0502020204030204" pitchFamily="34" charset="0"/>
+                        </a:rPr>
                         <a:t>7</a:t>
                       </a:r>
                     </a:p>
                   </a:txBody>
-                  <a:tcPr/>
+                  <a:tcPr marL="9525" marR="9525" marT="9525" marB="0" anchor="ctr"/>
                 </a:tc>
                 <a:tc>
                   <a:txBody>
                     <a:bodyPr/>
                     <a:lstStyle/>
                     <a:p>
+                      <a:pPr algn="l" rtl="0" fontAlgn="ctr"/>
                       <a:r>
-                        <a:rPr lang="de-DE" dirty="0"/>
+                        <a:rPr lang="de-DE" sz="1800" b="0" i="0" u="none" strike="noStrike">
+                          <a:solidFill>
+                            <a:srgbClr val="000000"/>
+                          </a:solidFill>
+                          <a:effectLst/>
+                          <a:latin typeface="Calibri" panose="020F0502020204030204" pitchFamily="34" charset="0"/>
+                        </a:rPr>
                         <a:t>9</a:t>
                       </a:r>
                     </a:p>
                   </a:txBody>
-                  <a:tcPr/>
+                  <a:tcPr marL="9525" marR="9525" marT="9525" marB="0" anchor="ctr"/>
                 </a:tc>
                 <a:extLst>
                   <a:ext uri="{0D108BD9-81ED-4DB2-BD59-A6C34878D82A}">
@@ -18340,65 +18703,100 @@
                     <a:bodyPr/>
                     <a:lstStyle/>
                     <a:p>
+                      <a:pPr algn="l" rtl="0" fontAlgn="ctr"/>
                       <a:r>
-                        <a:rPr lang="de-DE" dirty="0"/>
+                        <a:rPr lang="de-DE" sz="1800" b="0" i="0" u="none" strike="noStrike">
+                          <a:solidFill>
+                            <a:srgbClr val="000000"/>
+                          </a:solidFill>
+                          <a:effectLst/>
+                          <a:latin typeface="Calibri" panose="020F0502020204030204" pitchFamily="34" charset="0"/>
+                        </a:rPr>
                         <a:t>Fehleranfälligkeit</a:t>
                       </a:r>
                     </a:p>
                   </a:txBody>
-                  <a:tcPr/>
+                  <a:tcPr marL="9525" marR="9525" marT="9525" marB="0" anchor="ctr"/>
                 </a:tc>
                 <a:tc>
                   <a:txBody>
                     <a:bodyPr/>
                     <a:lstStyle/>
                     <a:p>
+                      <a:pPr algn="l" rtl="0" fontAlgn="ctr"/>
                       <a:r>
-                        <a:rPr lang="de-DE" dirty="0"/>
+                        <a:rPr lang="de-DE" sz="1800" b="0" i="0" u="none" strike="noStrike">
+                          <a:solidFill>
+                            <a:srgbClr val="000000"/>
+                          </a:solidFill>
+                          <a:effectLst/>
+                          <a:latin typeface="Calibri" panose="020F0502020204030204" pitchFamily="34" charset="0"/>
+                        </a:rPr>
                         <a:t>3</a:t>
                       </a:r>
                     </a:p>
                   </a:txBody>
-                  <a:tcPr/>
+                  <a:tcPr marL="9525" marR="9525" marT="9525" marB="0" anchor="ctr"/>
                 </a:tc>
                 <a:tc>
                   <a:txBody>
                     <a:bodyPr/>
                     <a:lstStyle/>
                     <a:p>
+                      <a:pPr algn="l" rtl="0" fontAlgn="ctr"/>
                       <a:r>
-                        <a:rPr lang="de-DE" dirty="0"/>
+                        <a:rPr lang="de-DE" sz="1800" b="0" i="0" u="none" strike="noStrike">
+                          <a:solidFill>
+                            <a:srgbClr val="000000"/>
+                          </a:solidFill>
+                          <a:effectLst/>
+                          <a:latin typeface="Calibri" panose="020F0502020204030204" pitchFamily="34" charset="0"/>
+                        </a:rPr>
                         <a:t>2</a:t>
                       </a:r>
                     </a:p>
                   </a:txBody>
-                  <a:tcPr/>
+                  <a:tcPr marL="9525" marR="9525" marT="9525" marB="0" anchor="ctr"/>
                 </a:tc>
                 <a:tc>
                   <a:txBody>
                     <a:bodyPr/>
                     <a:lstStyle/>
                     <a:p>
+                      <a:pPr algn="l" rtl="0" fontAlgn="ctr"/>
                       <a:r>
-                        <a:rPr lang="de-DE" dirty="0"/>
+                        <a:rPr lang="de-DE" sz="1800" b="0" i="0" u="none" strike="noStrike">
+                          <a:solidFill>
+                            <a:srgbClr val="000000"/>
+                          </a:solidFill>
+                          <a:effectLst/>
+                          <a:latin typeface="Calibri" panose="020F0502020204030204" pitchFamily="34" charset="0"/>
+                        </a:rPr>
                         <a:t>9</a:t>
                       </a:r>
                     </a:p>
                   </a:txBody>
-                  <a:tcPr/>
+                  <a:tcPr marL="9525" marR="9525" marT="9525" marB="0" anchor="ctr"/>
                 </a:tc>
                 <a:tc>
                   <a:txBody>
                     <a:bodyPr/>
                     <a:lstStyle/>
                     <a:p>
+                      <a:pPr algn="l" rtl="0" fontAlgn="ctr"/>
                       <a:r>
-                        <a:rPr lang="de-DE" dirty="0"/>
+                        <a:rPr lang="de-DE" sz="1800" b="0" i="0" u="none" strike="noStrike">
+                          <a:solidFill>
+                            <a:srgbClr val="000000"/>
+                          </a:solidFill>
+                          <a:effectLst/>
+                          <a:latin typeface="Calibri" panose="020F0502020204030204" pitchFamily="34" charset="0"/>
+                        </a:rPr>
                         <a:t>10</a:t>
                       </a:r>
                     </a:p>
                   </a:txBody>
-                  <a:tcPr/>
+                  <a:tcPr marL="9525" marR="9525" marT="9525" marB="0" anchor="ctr"/>
                 </a:tc>
                 <a:extLst>
                   <a:ext uri="{0D108BD9-81ED-4DB2-BD59-A6C34878D82A}">
@@ -18412,65 +18810,100 @@
                     <a:bodyPr/>
                     <a:lstStyle/>
                     <a:p>
+                      <a:pPr algn="l" rtl="0" fontAlgn="ctr"/>
                       <a:r>
-                        <a:rPr lang="de-DE" dirty="0"/>
+                        <a:rPr lang="de-DE" sz="1800" b="0" i="0" u="none" strike="noStrike">
+                          <a:solidFill>
+                            <a:srgbClr val="000000"/>
+                          </a:solidFill>
+                          <a:effectLst/>
+                          <a:latin typeface="Calibri" panose="020F0502020204030204" pitchFamily="34" charset="0"/>
+                        </a:rPr>
                         <a:t>Kosten</a:t>
                       </a:r>
                     </a:p>
                   </a:txBody>
-                  <a:tcPr/>
+                  <a:tcPr marL="9525" marR="9525" marT="9525" marB="0" anchor="ctr"/>
                 </a:tc>
                 <a:tc>
                   <a:txBody>
                     <a:bodyPr/>
                     <a:lstStyle/>
                     <a:p>
+                      <a:pPr algn="l" rtl="0" fontAlgn="ctr"/>
                       <a:r>
-                        <a:rPr lang="de-DE" dirty="0"/>
+                        <a:rPr lang="de-DE" sz="1800" b="0" i="0" u="none" strike="noStrike">
+                          <a:solidFill>
+                            <a:srgbClr val="000000"/>
+                          </a:solidFill>
+                          <a:effectLst/>
+                          <a:latin typeface="Calibri" panose="020F0502020204030204" pitchFamily="34" charset="0"/>
+                        </a:rPr>
                         <a:t>1</a:t>
                       </a:r>
                     </a:p>
                   </a:txBody>
-                  <a:tcPr/>
+                  <a:tcPr marL="9525" marR="9525" marT="9525" marB="0" anchor="ctr"/>
                 </a:tc>
                 <a:tc>
                   <a:txBody>
                     <a:bodyPr/>
                     <a:lstStyle/>
                     <a:p>
+                      <a:pPr algn="l" rtl="0" fontAlgn="ctr"/>
                       <a:r>
-                        <a:rPr lang="de-DE" dirty="0"/>
+                        <a:rPr lang="de-DE" sz="1800" b="0" i="0" u="none" strike="noStrike">
+                          <a:solidFill>
+                            <a:srgbClr val="000000"/>
+                          </a:solidFill>
+                          <a:effectLst/>
+                          <a:latin typeface="Calibri" panose="020F0502020204030204" pitchFamily="34" charset="0"/>
+                        </a:rPr>
                         <a:t>8</a:t>
                       </a:r>
                     </a:p>
                   </a:txBody>
-                  <a:tcPr/>
+                  <a:tcPr marL="9525" marR="9525" marT="9525" marB="0" anchor="ctr"/>
                 </a:tc>
                 <a:tc>
                   <a:txBody>
                     <a:bodyPr/>
                     <a:lstStyle/>
                     <a:p>
+                      <a:pPr algn="l" rtl="0" fontAlgn="ctr"/>
                       <a:r>
-                        <a:rPr lang="de-DE" dirty="0"/>
+                        <a:rPr lang="de-DE" sz="1800" b="0" i="0" u="none" strike="noStrike">
+                          <a:solidFill>
+                            <a:srgbClr val="000000"/>
+                          </a:solidFill>
+                          <a:effectLst/>
+                          <a:latin typeface="Calibri" panose="020F0502020204030204" pitchFamily="34" charset="0"/>
+                        </a:rPr>
                         <a:t>5</a:t>
                       </a:r>
                     </a:p>
                   </a:txBody>
-                  <a:tcPr/>
+                  <a:tcPr marL="9525" marR="9525" marT="9525" marB="0" anchor="ctr"/>
                 </a:tc>
                 <a:tc>
                   <a:txBody>
                     <a:bodyPr/>
                     <a:lstStyle/>
                     <a:p>
+                      <a:pPr algn="l" rtl="0" fontAlgn="ctr"/>
                       <a:r>
-                        <a:rPr lang="de-DE" dirty="0"/>
+                        <a:rPr lang="de-DE" sz="1800" b="0" i="0" u="none" strike="noStrike">
+                          <a:solidFill>
+                            <a:srgbClr val="000000"/>
+                          </a:solidFill>
+                          <a:effectLst/>
+                          <a:latin typeface="Calibri" panose="020F0502020204030204" pitchFamily="34" charset="0"/>
+                        </a:rPr>
                         <a:t>4</a:t>
                       </a:r>
                     </a:p>
                   </a:txBody>
-                  <a:tcPr/>
+                  <a:tcPr marL="9525" marR="9525" marT="9525" marB="0" anchor="ctr"/>
                 </a:tc>
                 <a:extLst>
                   <a:ext uri="{0D108BD9-81ED-4DB2-BD59-A6C34878D82A}">
@@ -18484,65 +18917,100 @@
                     <a:bodyPr/>
                     <a:lstStyle/>
                     <a:p>
+                      <a:pPr algn="l" rtl="0" fontAlgn="ctr"/>
                       <a:r>
-                        <a:rPr lang="de-DE" dirty="0"/>
+                        <a:rPr lang="de-DE" sz="1800" b="0" i="0" u="none" strike="noStrike">
+                          <a:solidFill>
+                            <a:srgbClr val="000000"/>
+                          </a:solidFill>
+                          <a:effectLst/>
+                          <a:latin typeface="Calibri" panose="020F0502020204030204" pitchFamily="34" charset="0"/>
+                        </a:rPr>
                         <a:t>Zeitaufwand</a:t>
                       </a:r>
                     </a:p>
                   </a:txBody>
-                  <a:tcPr/>
+                  <a:tcPr marL="9525" marR="9525" marT="9525" marB="0" anchor="ctr"/>
                 </a:tc>
                 <a:tc>
                   <a:txBody>
                     <a:bodyPr/>
                     <a:lstStyle/>
                     <a:p>
+                      <a:pPr algn="l" rtl="0" fontAlgn="ctr"/>
                       <a:r>
-                        <a:rPr lang="de-DE" dirty="0"/>
+                        <a:rPr lang="de-DE" sz="1800" b="0" i="0" u="none" strike="noStrike">
+                          <a:solidFill>
+                            <a:srgbClr val="000000"/>
+                          </a:solidFill>
+                          <a:effectLst/>
+                          <a:latin typeface="Calibri" panose="020F0502020204030204" pitchFamily="34" charset="0"/>
+                        </a:rPr>
                         <a:t>5</a:t>
                       </a:r>
                     </a:p>
                   </a:txBody>
-                  <a:tcPr/>
+                  <a:tcPr marL="9525" marR="9525" marT="9525" marB="0" anchor="ctr"/>
                 </a:tc>
                 <a:tc>
                   <a:txBody>
                     <a:bodyPr/>
                     <a:lstStyle/>
                     <a:p>
+                      <a:pPr algn="l" rtl="0" fontAlgn="ctr"/>
                       <a:r>
-                        <a:rPr lang="de-DE" dirty="0"/>
+                        <a:rPr lang="de-DE" sz="1800" b="0" i="0" u="none" strike="noStrike">
+                          <a:solidFill>
+                            <a:srgbClr val="000000"/>
+                          </a:solidFill>
+                          <a:effectLst/>
+                          <a:latin typeface="Calibri" panose="020F0502020204030204" pitchFamily="34" charset="0"/>
+                        </a:rPr>
                         <a:t>1</a:t>
                       </a:r>
                     </a:p>
                   </a:txBody>
-                  <a:tcPr/>
+                  <a:tcPr marL="9525" marR="9525" marT="9525" marB="0" anchor="ctr"/>
                 </a:tc>
                 <a:tc>
                   <a:txBody>
                     <a:bodyPr/>
                     <a:lstStyle/>
                     <a:p>
+                      <a:pPr algn="l" rtl="0" fontAlgn="ctr"/>
                       <a:r>
-                        <a:rPr lang="de-DE" dirty="0"/>
+                        <a:rPr lang="de-DE" sz="1800" b="0" i="0" u="none" strike="noStrike">
+                          <a:solidFill>
+                            <a:srgbClr val="000000"/>
+                          </a:solidFill>
+                          <a:effectLst/>
+                          <a:latin typeface="Calibri" panose="020F0502020204030204" pitchFamily="34" charset="0"/>
+                        </a:rPr>
                         <a:t>7</a:t>
                       </a:r>
                     </a:p>
                   </a:txBody>
-                  <a:tcPr/>
+                  <a:tcPr marL="9525" marR="9525" marT="9525" marB="0" anchor="ctr"/>
                 </a:tc>
                 <a:tc>
                   <a:txBody>
                     <a:bodyPr/>
                     <a:lstStyle/>
                     <a:p>
+                      <a:pPr algn="l" rtl="0" fontAlgn="ctr"/>
                       <a:r>
-                        <a:rPr lang="de-DE" dirty="0"/>
+                        <a:rPr lang="de-DE" sz="1800" b="0" i="0" u="none" strike="noStrike">
+                          <a:solidFill>
+                            <a:srgbClr val="000000"/>
+                          </a:solidFill>
+                          <a:effectLst/>
+                          <a:latin typeface="Calibri" panose="020F0502020204030204" pitchFamily="34" charset="0"/>
+                        </a:rPr>
                         <a:t>9</a:t>
                       </a:r>
                     </a:p>
                   </a:txBody>
-                  <a:tcPr/>
+                  <a:tcPr marL="9525" marR="9525" marT="9525" marB="0" anchor="ctr"/>
                 </a:tc>
                 <a:extLst>
                   <a:ext uri="{0D108BD9-81ED-4DB2-BD59-A6C34878D82A}">
@@ -18556,76 +19024,100 @@
                     <a:bodyPr/>
                     <a:lstStyle/>
                     <a:p>
+                      <a:pPr algn="l" rtl="0" fontAlgn="ctr"/>
                       <a:r>
-                        <a:rPr lang="de-DE" dirty="0"/>
+                        <a:rPr lang="de-DE" sz="1800" b="0" i="0" u="none" strike="noStrike">
+                          <a:solidFill>
+                            <a:srgbClr val="000000"/>
+                          </a:solidFill>
+                          <a:effectLst/>
+                          <a:latin typeface="Calibri" panose="020F0502020204030204" pitchFamily="34" charset="0"/>
+                        </a:rPr>
                         <a:t>Summe</a:t>
                       </a:r>
                     </a:p>
                   </a:txBody>
-                  <a:tcPr/>
+                  <a:tcPr marL="9525" marR="9525" marT="9525" marB="0" anchor="ctr"/>
                 </a:tc>
                 <a:tc>
                   <a:txBody>
                     <a:bodyPr/>
                     <a:lstStyle/>
                     <a:p>
-                      <a:endParaRPr lang="de-DE" dirty="0"/>
+                      <a:pPr algn="l" fontAlgn="t"/>
+                      <a:r>
+                        <a:rPr lang="de-DE" sz="1800" b="0" i="0" u="none" strike="noStrike">
+                          <a:solidFill>
+                            <a:srgbClr val="000000"/>
+                          </a:solidFill>
+                          <a:effectLst/>
+                          <a:latin typeface="Arial" panose="020B0604020202020204" pitchFamily="34" charset="0"/>
+                        </a:rPr>
+                        <a:t> </a:t>
+                      </a:r>
                     </a:p>
                   </a:txBody>
-                  <a:tcPr/>
+                  <a:tcPr marL="9525" marR="9525" marT="9525" marB="0"/>
                 </a:tc>
                 <a:tc>
                   <a:txBody>
                     <a:bodyPr/>
                     <a:lstStyle/>
                     <a:p>
-                      <a:pPr marL="0" marR="0" lvl="0" indent="0" algn="l" defTabSz="914400" rtl="0" eaLnBrk="1" fontAlgn="auto" latinLnBrk="0" hangingPunct="1">
-                        <a:lnSpc>
-                          <a:spcPct val="100000"/>
-                        </a:lnSpc>
-                        <a:spcBef>
-                          <a:spcPts val="0"/>
-                        </a:spcBef>
-                        <a:spcAft>
-                          <a:spcPts val="0"/>
-                        </a:spcAft>
-                        <a:buClrTx/>
-                        <a:buSzTx/>
-                        <a:buFontTx/>
-                        <a:buNone/>
-                        <a:tabLst/>
-                        <a:defRPr/>
-                      </a:pPr>
+                      <a:pPr algn="l" rtl="0" fontAlgn="ctr"/>
                       <a:r>
-                        <a:rPr lang="de-DE"/>
-                        <a:t>=b2*c2</a:t>
+                        <a:rPr lang="de-DE" sz="1800" b="0" i="0" u="none" strike="noStrike">
+                          <a:solidFill>
+                            <a:srgbClr val="000000"/>
+                          </a:solidFill>
+                          <a:effectLst/>
+                          <a:latin typeface="Calibri" panose="020F0502020204030204" pitchFamily="34" charset="0"/>
+                        </a:rPr>
+                        <a:t>23</a:t>
                       </a:r>
                     </a:p>
-                    <a:p>
-                      <a:endParaRPr lang="de-DE" dirty="0"/>
-                    </a:p>
                   </a:txBody>
-                  <a:tcPr/>
+                  <a:tcPr marL="9525" marR="9525" marT="9525" marB="0" anchor="ctr"/>
                 </a:tc>
                 <a:tc>
                   <a:txBody>
                     <a:bodyPr/>
                     <a:lstStyle/>
                     <a:p>
-                      <a:endParaRPr lang="de-DE"/>
+                      <a:pPr algn="l" rtl="0" fontAlgn="ctr"/>
+                      <a:r>
+                        <a:rPr lang="de-DE" sz="1800" b="0" i="0" u="none" strike="noStrike">
+                          <a:solidFill>
+                            <a:srgbClr val="000000"/>
+                          </a:solidFill>
+                          <a:effectLst/>
+                          <a:latin typeface="Calibri" panose="020F0502020204030204" pitchFamily="34" charset="0"/>
+                        </a:rPr>
+                        <a:t>81</a:t>
+                      </a:r>
                     </a:p>
                   </a:txBody>
-                  <a:tcPr/>
+                  <a:tcPr marL="9525" marR="9525" marT="9525" marB="0" anchor="ctr"/>
                 </a:tc>
                 <a:tc>
                   <a:txBody>
                     <a:bodyPr/>
                     <a:lstStyle/>
                     <a:p>
-                      <a:endParaRPr lang="de-DE" dirty="0"/>
+                      <a:pPr algn="l" rtl="0" fontAlgn="ctr"/>
+                      <a:r>
+                        <a:rPr lang="de-DE" sz="1800" b="0" i="0" u="none" strike="noStrike" dirty="0">
+                          <a:solidFill>
+                            <a:srgbClr val="000000"/>
+                          </a:solidFill>
+                          <a:effectLst/>
+                          <a:latin typeface="Calibri" panose="020F0502020204030204" pitchFamily="34" charset="0"/>
+                        </a:rPr>
+                        <a:t>97</a:t>
+                      </a:r>
                     </a:p>
                   </a:txBody>
-                  <a:tcPr/>
+                  <a:tcPr marL="9525" marR="9525" marT="9525" marB="0" anchor="ctr"/>
                 </a:tc>
                 <a:extLst>
                   <a:ext uri="{0D108BD9-81ED-4DB2-BD59-A6C34878D82A}">
@@ -18669,72 +19161,339 @@
       </p:grpSpPr>
       <p:sp>
         <p:nvSpPr>
-          <p:cNvPr id="2" name="Titel 1"/>
-          <p:cNvSpPr>
-            <a:spLocks noGrp="1"/>
-          </p:cNvSpPr>
-          <p:nvPr>
-            <p:ph type="title"/>
-          </p:nvPr>
-        </p:nvSpPr>
-        <p:spPr/>
-        <p:txBody>
-          <a:bodyPr>
-            <a:normAutofit fontScale="90000"/>
-          </a:bodyPr>
-          <a:lstStyle/>
-          <a:p>
-            <a:r>
-              <a:rPr lang="de-DE" dirty="0"/>
-              <a:t>Projektumfeld - Das Institut</a:t>
-            </a:r>
-          </a:p>
-        </p:txBody>
-      </p:sp>
-      <p:sp>
-        <p:nvSpPr>
-          <p:cNvPr id="6" name="Rechteck 5"/>
+          <p:cNvPr id="22" name="Rechteck 21"/>
           <p:cNvSpPr/>
           <p:nvPr/>
         </p:nvSpPr>
         <p:spPr>
           <a:xfrm>
-            <a:off x="323528" y="6237312"/>
-            <a:ext cx="1440160" cy="620688"/>
+            <a:off x="128588" y="1052736"/>
+            <a:ext cx="2081212" cy="328613"/>
           </a:xfrm>
           <a:prstGeom prst="rect">
             <a:avLst/>
           </a:prstGeom>
-          <a:ln>
-            <a:noFill/>
-          </a:ln>
         </p:spPr>
         <p:style>
           <a:lnRef idx="2">
-            <a:schemeClr val="dk1"/>
+            <a:schemeClr val="accent1"/>
           </a:lnRef>
           <a:fillRef idx="1">
             <a:schemeClr val="lt1"/>
           </a:fillRef>
           <a:effectRef idx="0">
-            <a:schemeClr val="dk1"/>
+            <a:schemeClr val="accent1"/>
           </a:effectRef>
           <a:fontRef idx="minor">
             <a:schemeClr val="dk1"/>
           </a:fontRef>
         </p:style>
         <p:txBody>
-          <a:bodyPr rtlCol="0" anchor="ctr"/>
+          <a:bodyPr anchor="ctr"/>
           <a:lstStyle/>
           <a:p>
-            <a:pPr algn="ctr"/>
-            <a:endParaRPr lang="de-DE"/>
+            <a:pPr algn="ctr">
+              <a:defRPr/>
+            </a:pPr>
+            <a:r>
+              <a:rPr lang="de-DE" sz="1600" b="1" dirty="0">
+                <a:latin typeface="Rotis SemiSans Pro" pitchFamily="50" charset="0"/>
+              </a:rPr>
+              <a:t>Reflektion</a:t>
+            </a:r>
+            <a:endParaRPr lang="de-DE" sz="2000" b="1" dirty="0">
+              <a:latin typeface="Rotis SemiSans Pro" pitchFamily="50" charset="0"/>
+            </a:endParaRPr>
+          </a:p>
+        </p:txBody>
+      </p:sp>
+      <p:cxnSp>
+        <p:nvCxnSpPr>
+          <p:cNvPr id="23" name="Gerade Verbindung 22"/>
+          <p:cNvCxnSpPr/>
+          <p:nvPr/>
+        </p:nvCxnSpPr>
+        <p:spPr>
+          <a:xfrm>
+            <a:off x="2392363" y="980728"/>
+            <a:ext cx="0" cy="5256584"/>
+          </a:xfrm>
+          <a:prstGeom prst="line">
+            <a:avLst/>
+          </a:prstGeom>
+          <a:ln/>
+        </p:spPr>
+        <p:style>
+          <a:lnRef idx="1">
+            <a:schemeClr val="dk1"/>
+          </a:lnRef>
+          <a:fillRef idx="0">
+            <a:schemeClr val="dk1"/>
+          </a:fillRef>
+          <a:effectRef idx="0">
+            <a:schemeClr val="dk1"/>
+          </a:effectRef>
+          <a:fontRef idx="minor">
+            <a:schemeClr val="tx1"/>
+          </a:fontRef>
+        </p:style>
+      </p:cxnSp>
+      <p:cxnSp>
+        <p:nvCxnSpPr>
+          <p:cNvPr id="24" name="Gerade Verbindung 23"/>
+          <p:cNvCxnSpPr/>
+          <p:nvPr/>
+        </p:nvCxnSpPr>
+        <p:spPr>
+          <a:xfrm>
+            <a:off x="128588" y="6309320"/>
+            <a:ext cx="8885237" cy="0"/>
+          </a:xfrm>
+          <a:prstGeom prst="line">
+            <a:avLst/>
+          </a:prstGeom>
+        </p:spPr>
+        <p:style>
+          <a:lnRef idx="1">
+            <a:schemeClr val="dk1"/>
+          </a:lnRef>
+          <a:fillRef idx="0">
+            <a:schemeClr val="dk1"/>
+          </a:fillRef>
+          <a:effectRef idx="0">
+            <a:schemeClr val="dk1"/>
+          </a:effectRef>
+          <a:fontRef idx="minor">
+            <a:schemeClr val="tx1"/>
+          </a:fontRef>
+        </p:style>
+      </p:cxnSp>
+      <p:cxnSp>
+        <p:nvCxnSpPr>
+          <p:cNvPr id="26" name="Gerade Verbindung 25"/>
+          <p:cNvCxnSpPr/>
+          <p:nvPr/>
+        </p:nvCxnSpPr>
+        <p:spPr>
+          <a:xfrm>
+            <a:off x="128587" y="908720"/>
+            <a:ext cx="8885237" cy="0"/>
+          </a:xfrm>
+          <a:prstGeom prst="line">
+            <a:avLst/>
+          </a:prstGeom>
+        </p:spPr>
+        <p:style>
+          <a:lnRef idx="1">
+            <a:schemeClr val="dk1"/>
+          </a:lnRef>
+          <a:fillRef idx="0">
+            <a:schemeClr val="dk1"/>
+          </a:fillRef>
+          <a:effectRef idx="0">
+            <a:schemeClr val="dk1"/>
+          </a:effectRef>
+          <a:fontRef idx="minor">
+            <a:schemeClr val="tx1"/>
+          </a:fontRef>
+        </p:style>
+      </p:cxnSp>
+      <p:sp>
+        <p:nvSpPr>
+          <p:cNvPr id="27" name="Titel 1"/>
+          <p:cNvSpPr txBox="1">
+            <a:spLocks/>
+          </p:cNvSpPr>
+          <p:nvPr/>
+        </p:nvSpPr>
+        <p:spPr bwMode="auto">
+          <a:xfrm>
+            <a:off x="3779912" y="349920"/>
+            <a:ext cx="5299075" cy="558800"/>
+          </a:xfrm>
+          <a:prstGeom prst="rect">
+            <a:avLst/>
+          </a:prstGeom>
+          <a:noFill/>
+          <a:ln>
+            <a:noFill/>
+          </a:ln>
+          <a:extLst>
+            <a:ext uri="{909E8E84-426E-40DD-AFC4-6F175D3DCCD1}">
+              <a14:hiddenFill xmlns:a14="http://schemas.microsoft.com/office/drawing/2010/main">
+                <a:solidFill>
+                  <a:srgbClr val="FFFFFF"/>
+                </a:solidFill>
+              </a14:hiddenFill>
+            </a:ext>
+            <a:ext uri="{91240B29-F687-4F45-9708-019B960494DF}">
+              <a14:hiddenLine xmlns:a14="http://schemas.microsoft.com/office/drawing/2010/main" w="9525">
+                <a:solidFill>
+                  <a:srgbClr val="000000"/>
+                </a:solidFill>
+                <a:miter lim="800000"/>
+                <a:headEnd/>
+                <a:tailEnd/>
+              </a14:hiddenLine>
+            </a:ext>
+          </a:extLst>
+        </p:spPr>
+        <p:txBody>
+          <a:bodyPr anchor="ctr"/>
+          <a:lstStyle>
+            <a:lvl1pPr eaLnBrk="0" hangingPunct="0">
+              <a:spcBef>
+                <a:spcPct val="20000"/>
+              </a:spcBef>
+              <a:buFont typeface="Arial" charset="0"/>
+              <a:buChar char="•"/>
+              <a:defRPr sz="3200">
+                <a:solidFill>
+                  <a:schemeClr val="tx1"/>
+                </a:solidFill>
+                <a:latin typeface="Arial" charset="0"/>
+              </a:defRPr>
+            </a:lvl1pPr>
+            <a:lvl2pPr marL="742950" indent="-285750" eaLnBrk="0" hangingPunct="0">
+              <a:spcBef>
+                <a:spcPct val="20000"/>
+              </a:spcBef>
+              <a:buFont typeface="Arial" charset="0"/>
+              <a:buChar char="–"/>
+              <a:defRPr sz="2800">
+                <a:solidFill>
+                  <a:schemeClr val="tx1"/>
+                </a:solidFill>
+                <a:latin typeface="Arial" charset="0"/>
+              </a:defRPr>
+            </a:lvl2pPr>
+            <a:lvl3pPr marL="1143000" indent="-228600" eaLnBrk="0" hangingPunct="0">
+              <a:spcBef>
+                <a:spcPct val="20000"/>
+              </a:spcBef>
+              <a:buFont typeface="Arial" charset="0"/>
+              <a:buChar char="•"/>
+              <a:defRPr sz="2400">
+                <a:solidFill>
+                  <a:schemeClr val="tx1"/>
+                </a:solidFill>
+                <a:latin typeface="Arial" charset="0"/>
+              </a:defRPr>
+            </a:lvl3pPr>
+            <a:lvl4pPr marL="1600200" indent="-228600" eaLnBrk="0" hangingPunct="0">
+              <a:spcBef>
+                <a:spcPct val="20000"/>
+              </a:spcBef>
+              <a:buFont typeface="Arial" charset="0"/>
+              <a:buChar char="–"/>
+              <a:defRPr sz="2000">
+                <a:solidFill>
+                  <a:schemeClr val="tx1"/>
+                </a:solidFill>
+                <a:latin typeface="Arial" charset="0"/>
+              </a:defRPr>
+            </a:lvl4pPr>
+            <a:lvl5pPr marL="2057400" indent="-228600" eaLnBrk="0" hangingPunct="0">
+              <a:spcBef>
+                <a:spcPct val="20000"/>
+              </a:spcBef>
+              <a:buFont typeface="Arial" charset="0"/>
+              <a:buChar char="»"/>
+              <a:defRPr sz="2000">
+                <a:solidFill>
+                  <a:schemeClr val="tx1"/>
+                </a:solidFill>
+                <a:latin typeface="Arial" charset="0"/>
+              </a:defRPr>
+            </a:lvl5pPr>
+            <a:lvl6pPr marL="2514600" indent="-228600" eaLnBrk="0" fontAlgn="base" hangingPunct="0">
+              <a:spcBef>
+                <a:spcPct val="20000"/>
+              </a:spcBef>
+              <a:spcAft>
+                <a:spcPct val="0"/>
+              </a:spcAft>
+              <a:buFont typeface="Arial" charset="0"/>
+              <a:buChar char="»"/>
+              <a:defRPr sz="2000">
+                <a:solidFill>
+                  <a:schemeClr val="tx1"/>
+                </a:solidFill>
+                <a:latin typeface="Arial" charset="0"/>
+              </a:defRPr>
+            </a:lvl6pPr>
+            <a:lvl7pPr marL="2971800" indent="-228600" eaLnBrk="0" fontAlgn="base" hangingPunct="0">
+              <a:spcBef>
+                <a:spcPct val="20000"/>
+              </a:spcBef>
+              <a:spcAft>
+                <a:spcPct val="0"/>
+              </a:spcAft>
+              <a:buFont typeface="Arial" charset="0"/>
+              <a:buChar char="»"/>
+              <a:defRPr sz="2000">
+                <a:solidFill>
+                  <a:schemeClr val="tx1"/>
+                </a:solidFill>
+                <a:latin typeface="Arial" charset="0"/>
+              </a:defRPr>
+            </a:lvl7pPr>
+            <a:lvl8pPr marL="3429000" indent="-228600" eaLnBrk="0" fontAlgn="base" hangingPunct="0">
+              <a:spcBef>
+                <a:spcPct val="20000"/>
+              </a:spcBef>
+              <a:spcAft>
+                <a:spcPct val="0"/>
+              </a:spcAft>
+              <a:buFont typeface="Arial" charset="0"/>
+              <a:buChar char="»"/>
+              <a:defRPr sz="2000">
+                <a:solidFill>
+                  <a:schemeClr val="tx1"/>
+                </a:solidFill>
+                <a:latin typeface="Arial" charset="0"/>
+              </a:defRPr>
+            </a:lvl8pPr>
+            <a:lvl9pPr marL="3886200" indent="-228600" eaLnBrk="0" fontAlgn="base" hangingPunct="0">
+              <a:spcBef>
+                <a:spcPct val="20000"/>
+              </a:spcBef>
+              <a:spcAft>
+                <a:spcPct val="0"/>
+              </a:spcAft>
+              <a:buFont typeface="Arial" charset="0"/>
+              <a:buChar char="»"/>
+              <a:defRPr sz="2000">
+                <a:solidFill>
+                  <a:schemeClr val="tx1"/>
+                </a:solidFill>
+                <a:latin typeface="Arial" charset="0"/>
+              </a:defRPr>
+            </a:lvl9pPr>
+          </a:lstStyle>
+          <a:p>
+            <a:pPr>
+              <a:spcBef>
+                <a:spcPct val="0"/>
+              </a:spcBef>
+              <a:buFontTx/>
+              <a:buNone/>
+            </a:pPr>
+            <a:r>
+              <a:rPr lang="de-DE" altLang="de-DE" sz="1400" b="1" dirty="0">
+                <a:latin typeface="Rotis SemiSans Pro" pitchFamily="50" charset="0"/>
+              </a:rPr>
+              <a:t>Erweiterung QES Export</a:t>
+            </a:r>
+            <a:endParaRPr lang="de-DE" altLang="de-DE" sz="3600" dirty="0">
+              <a:latin typeface="Rotis SemiSans Pro" pitchFamily="50" charset="0"/>
+            </a:endParaRPr>
           </a:p>
         </p:txBody>
       </p:sp>
       <p:sp>
         <p:nvSpPr>
-          <p:cNvPr id="7" name="Foliennummernplatzhalter 6"/>
+          <p:cNvPr id="30" name="Foliennummernplatzhalter 29"/>
           <p:cNvSpPr>
             <a:spLocks noGrp="1"/>
           </p:cNvSpPr>
@@ -18747,48 +19506,967 @@
           <a:bodyPr/>
           <a:lstStyle/>
           <a:p>
-            <a:fld id="{AC76F9B2-121F-446C-A37F-B7F54BF3DCAC}" type="slidenum">
+            <a:fld id="{506DEF79-D5F3-42ED-9335-D73AD216BB54}" type="slidenum">
               <a:rPr lang="de-DE" smtClean="0"/>
+              <a:pPr/>
               <a:t>9</a:t>
             </a:fld>
             <a:endParaRPr lang="de-DE" dirty="0"/>
           </a:p>
         </p:txBody>
       </p:sp>
-      <p:pic>
-        <p:nvPicPr>
-          <p:cNvPr id="3" name="Picture 2">
-            <a:extLst>
-              <a:ext uri="{FF2B5EF4-FFF2-40B4-BE49-F238E27FC236}">
-                <a16:creationId xmlns:a16="http://schemas.microsoft.com/office/drawing/2014/main" id="{59164D2C-E2DF-EA48-8243-D028C4461300}"/>
-              </a:ext>
-            </a:extLst>
-          </p:cNvPr>
-          <p:cNvPicPr>
-            <a:picLocks noChangeAspect="1"/>
-          </p:cNvPicPr>
+      <p:sp>
+        <p:nvSpPr>
+          <p:cNvPr id="31" name="Rechteck 4104"/>
+          <p:cNvSpPr>
+            <a:spLocks noChangeArrowheads="1"/>
+          </p:cNvSpPr>
           <p:nvPr/>
-        </p:nvPicPr>
-        <p:blipFill>
-          <a:blip r:embed="rId3"/>
-          <a:stretch>
-            <a:fillRect/>
-          </a:stretch>
-        </p:blipFill>
-        <p:spPr>
+        </p:nvSpPr>
+        <p:spPr bwMode="auto">
           <a:xfrm>
-            <a:off x="1034412" y="1412197"/>
-            <a:ext cx="7075176" cy="5009917"/>
+            <a:off x="2555776" y="980728"/>
+            <a:ext cx="6523037" cy="400050"/>
           </a:xfrm>
           <a:prstGeom prst="rect">
             <a:avLst/>
           </a:prstGeom>
+          <a:noFill/>
+          <a:ln>
+            <a:noFill/>
+          </a:ln>
+          <a:extLst>
+            <a:ext uri="{909E8E84-426E-40DD-AFC4-6F175D3DCCD1}">
+              <a14:hiddenFill xmlns:a14="http://schemas.microsoft.com/office/drawing/2010/main">
+                <a:solidFill>
+                  <a:srgbClr val="FFFFFF"/>
+                </a:solidFill>
+              </a14:hiddenFill>
+            </a:ext>
+            <a:ext uri="{91240B29-F687-4F45-9708-019B960494DF}">
+              <a14:hiddenLine xmlns:a14="http://schemas.microsoft.com/office/drawing/2010/main" w="9525">
+                <a:solidFill>
+                  <a:srgbClr val="000000"/>
+                </a:solidFill>
+                <a:miter lim="800000"/>
+                <a:headEnd/>
+                <a:tailEnd/>
+              </a14:hiddenLine>
+            </a:ext>
+          </a:extLst>
         </p:spPr>
-      </p:pic>
+        <p:txBody>
+          <a:bodyPr>
+            <a:spAutoFit/>
+          </a:bodyPr>
+          <a:lstStyle>
+            <a:lvl1pPr eaLnBrk="0" hangingPunct="0">
+              <a:spcBef>
+                <a:spcPct val="20000"/>
+              </a:spcBef>
+              <a:buFont typeface="Arial" charset="0"/>
+              <a:buChar char="•"/>
+              <a:defRPr sz="3200">
+                <a:solidFill>
+                  <a:schemeClr val="tx1"/>
+                </a:solidFill>
+                <a:latin typeface="Arial" charset="0"/>
+              </a:defRPr>
+            </a:lvl1pPr>
+            <a:lvl2pPr marL="742950" indent="-285750" eaLnBrk="0" hangingPunct="0">
+              <a:spcBef>
+                <a:spcPct val="20000"/>
+              </a:spcBef>
+              <a:buFont typeface="Arial" charset="0"/>
+              <a:buChar char="–"/>
+              <a:defRPr sz="2800">
+                <a:solidFill>
+                  <a:schemeClr val="tx1"/>
+                </a:solidFill>
+                <a:latin typeface="Arial" charset="0"/>
+              </a:defRPr>
+            </a:lvl2pPr>
+            <a:lvl3pPr marL="1143000" indent="-228600" eaLnBrk="0" hangingPunct="0">
+              <a:spcBef>
+                <a:spcPct val="20000"/>
+              </a:spcBef>
+              <a:buFont typeface="Arial" charset="0"/>
+              <a:buChar char="•"/>
+              <a:defRPr sz="2400">
+                <a:solidFill>
+                  <a:schemeClr val="tx1"/>
+                </a:solidFill>
+                <a:latin typeface="Arial" charset="0"/>
+              </a:defRPr>
+            </a:lvl3pPr>
+            <a:lvl4pPr marL="1600200" indent="-228600" eaLnBrk="0" hangingPunct="0">
+              <a:spcBef>
+                <a:spcPct val="20000"/>
+              </a:spcBef>
+              <a:buFont typeface="Arial" charset="0"/>
+              <a:buChar char="–"/>
+              <a:defRPr sz="2000">
+                <a:solidFill>
+                  <a:schemeClr val="tx1"/>
+                </a:solidFill>
+                <a:latin typeface="Arial" charset="0"/>
+              </a:defRPr>
+            </a:lvl4pPr>
+            <a:lvl5pPr marL="2057400" indent="-228600" eaLnBrk="0" hangingPunct="0">
+              <a:spcBef>
+                <a:spcPct val="20000"/>
+              </a:spcBef>
+              <a:buFont typeface="Arial" charset="0"/>
+              <a:buChar char="»"/>
+              <a:defRPr sz="2000">
+                <a:solidFill>
+                  <a:schemeClr val="tx1"/>
+                </a:solidFill>
+                <a:latin typeface="Arial" charset="0"/>
+              </a:defRPr>
+            </a:lvl5pPr>
+            <a:lvl6pPr marL="2514600" indent="-228600" eaLnBrk="0" fontAlgn="base" hangingPunct="0">
+              <a:spcBef>
+                <a:spcPct val="20000"/>
+              </a:spcBef>
+              <a:spcAft>
+                <a:spcPct val="0"/>
+              </a:spcAft>
+              <a:buFont typeface="Arial" charset="0"/>
+              <a:buChar char="»"/>
+              <a:defRPr sz="2000">
+                <a:solidFill>
+                  <a:schemeClr val="tx1"/>
+                </a:solidFill>
+                <a:latin typeface="Arial" charset="0"/>
+              </a:defRPr>
+            </a:lvl6pPr>
+            <a:lvl7pPr marL="2971800" indent="-228600" eaLnBrk="0" fontAlgn="base" hangingPunct="0">
+              <a:spcBef>
+                <a:spcPct val="20000"/>
+              </a:spcBef>
+              <a:spcAft>
+                <a:spcPct val="0"/>
+              </a:spcAft>
+              <a:buFont typeface="Arial" charset="0"/>
+              <a:buChar char="»"/>
+              <a:defRPr sz="2000">
+                <a:solidFill>
+                  <a:schemeClr val="tx1"/>
+                </a:solidFill>
+                <a:latin typeface="Arial" charset="0"/>
+              </a:defRPr>
+            </a:lvl7pPr>
+            <a:lvl8pPr marL="3429000" indent="-228600" eaLnBrk="0" fontAlgn="base" hangingPunct="0">
+              <a:spcBef>
+                <a:spcPct val="20000"/>
+              </a:spcBef>
+              <a:spcAft>
+                <a:spcPct val="0"/>
+              </a:spcAft>
+              <a:buFont typeface="Arial" charset="0"/>
+              <a:buChar char="»"/>
+              <a:defRPr sz="2000">
+                <a:solidFill>
+                  <a:schemeClr val="tx1"/>
+                </a:solidFill>
+                <a:latin typeface="Arial" charset="0"/>
+              </a:defRPr>
+            </a:lvl8pPr>
+            <a:lvl9pPr marL="3886200" indent="-228600" eaLnBrk="0" fontAlgn="base" hangingPunct="0">
+              <a:spcBef>
+                <a:spcPct val="20000"/>
+              </a:spcBef>
+              <a:spcAft>
+                <a:spcPct val="0"/>
+              </a:spcAft>
+              <a:buFont typeface="Arial" charset="0"/>
+              <a:buChar char="»"/>
+              <a:defRPr sz="2000">
+                <a:solidFill>
+                  <a:schemeClr val="tx1"/>
+                </a:solidFill>
+                <a:latin typeface="Arial" charset="0"/>
+              </a:defRPr>
+            </a:lvl9pPr>
+          </a:lstStyle>
+          <a:p>
+            <a:pPr eaLnBrk="1" hangingPunct="1">
+              <a:spcBef>
+                <a:spcPct val="0"/>
+              </a:spcBef>
+              <a:buNone/>
+            </a:pPr>
+            <a:r>
+              <a:rPr lang="de-DE" altLang="de-DE" sz="2000" b="1" dirty="0">
+                <a:latin typeface="Rotis SemiSans Pro" pitchFamily="50" charset="0"/>
+              </a:rPr>
+              <a:t>Organisation - Organigramm</a:t>
+            </a:r>
+          </a:p>
+        </p:txBody>
+      </p:sp>
+      <p:sp>
+        <p:nvSpPr>
+          <p:cNvPr id="15" name="Rechteck 14"/>
+          <p:cNvSpPr/>
+          <p:nvPr/>
+        </p:nvSpPr>
+        <p:spPr>
+          <a:xfrm>
+            <a:off x="128588" y="2348880"/>
+            <a:ext cx="2081212" cy="328613"/>
+          </a:xfrm>
+          <a:prstGeom prst="rect">
+            <a:avLst/>
+          </a:prstGeom>
+          <a:ln>
+            <a:solidFill>
+              <a:schemeClr val="bg2">
+                <a:lumMod val="90000"/>
+              </a:schemeClr>
+            </a:solidFill>
+          </a:ln>
+        </p:spPr>
+        <p:style>
+          <a:lnRef idx="2">
+            <a:schemeClr val="accent3"/>
+          </a:lnRef>
+          <a:fillRef idx="1">
+            <a:schemeClr val="lt1"/>
+          </a:fillRef>
+          <a:effectRef idx="0">
+            <a:schemeClr val="accent3"/>
+          </a:effectRef>
+          <a:fontRef idx="minor">
+            <a:schemeClr val="dk1"/>
+          </a:fontRef>
+        </p:style>
+        <p:txBody>
+          <a:bodyPr anchor="ctr"/>
+          <a:lstStyle/>
+          <a:p>
+            <a:pPr algn="ctr">
+              <a:defRPr/>
+            </a:pPr>
+            <a:r>
+              <a:rPr lang="de-DE" sz="1200" dirty="0">
+                <a:latin typeface="Rotis SemiSans Pro" pitchFamily="50" charset="0"/>
+              </a:rPr>
+              <a:t>Akzeptanz</a:t>
+            </a:r>
+            <a:endParaRPr lang="de-DE" sz="1100" dirty="0">
+              <a:latin typeface="Rotis SemiSans Pro" pitchFamily="50" charset="0"/>
+            </a:endParaRPr>
+          </a:p>
+        </p:txBody>
+      </p:sp>
+      <p:sp>
+        <p:nvSpPr>
+          <p:cNvPr id="17" name="Rechteck 16"/>
+          <p:cNvSpPr/>
+          <p:nvPr/>
+        </p:nvSpPr>
+        <p:spPr>
+          <a:xfrm>
+            <a:off x="128588" y="1916832"/>
+            <a:ext cx="2081212" cy="327025"/>
+          </a:xfrm>
+          <a:prstGeom prst="rect">
+            <a:avLst/>
+          </a:prstGeom>
+          <a:ln>
+            <a:solidFill>
+              <a:schemeClr val="accent3"/>
+            </a:solidFill>
+          </a:ln>
+        </p:spPr>
+        <p:style>
+          <a:lnRef idx="2">
+            <a:schemeClr val="accent3"/>
+          </a:lnRef>
+          <a:fillRef idx="1">
+            <a:schemeClr val="lt1"/>
+          </a:fillRef>
+          <a:effectRef idx="0">
+            <a:schemeClr val="accent3"/>
+          </a:effectRef>
+          <a:fontRef idx="minor">
+            <a:schemeClr val="dk1"/>
+          </a:fontRef>
+        </p:style>
+        <p:txBody>
+          <a:bodyPr anchor="ctr"/>
+          <a:lstStyle/>
+          <a:p>
+            <a:pPr algn="ctr">
+              <a:buFont typeface="Arial" charset="0"/>
+              <a:buNone/>
+              <a:defRPr/>
+            </a:pPr>
+            <a:r>
+              <a:rPr lang="de-DE" altLang="de-DE" sz="1200" b="1" dirty="0">
+                <a:latin typeface="Rotis SemiSans Pro" pitchFamily="50" charset="0"/>
+              </a:rPr>
+              <a:t>Dokumentation</a:t>
+            </a:r>
+          </a:p>
+        </p:txBody>
+      </p:sp>
+      <p:sp>
+        <p:nvSpPr>
+          <p:cNvPr id="18" name="Rechteck 17"/>
+          <p:cNvSpPr/>
+          <p:nvPr/>
+        </p:nvSpPr>
+        <p:spPr>
+          <a:xfrm>
+            <a:off x="128588" y="1484784"/>
+            <a:ext cx="2081212" cy="328613"/>
+          </a:xfrm>
+          <a:prstGeom prst="rect">
+            <a:avLst/>
+          </a:prstGeom>
+          <a:ln>
+            <a:solidFill>
+              <a:schemeClr val="bg2">
+                <a:lumMod val="90000"/>
+              </a:schemeClr>
+            </a:solidFill>
+          </a:ln>
+        </p:spPr>
+        <p:style>
+          <a:lnRef idx="2">
+            <a:schemeClr val="accent3"/>
+          </a:lnRef>
+          <a:fillRef idx="1">
+            <a:schemeClr val="lt1"/>
+          </a:fillRef>
+          <a:effectRef idx="0">
+            <a:schemeClr val="accent3"/>
+          </a:effectRef>
+          <a:fontRef idx="minor">
+            <a:schemeClr val="dk1"/>
+          </a:fontRef>
+        </p:style>
+        <p:txBody>
+          <a:bodyPr anchor="ctr"/>
+          <a:lstStyle/>
+          <a:p>
+            <a:pPr algn="ctr">
+              <a:buFont typeface="Arial" charset="0"/>
+              <a:buNone/>
+              <a:defRPr/>
+            </a:pPr>
+            <a:r>
+              <a:rPr lang="de-DE" altLang="de-DE" sz="1200" dirty="0">
+                <a:latin typeface="Rotis SemiSans Pro" pitchFamily="50" charset="0"/>
+              </a:rPr>
+              <a:t>Nutzwertanalyse</a:t>
+            </a:r>
+          </a:p>
+        </p:txBody>
+      </p:sp>
+      <p:graphicFrame>
+        <p:nvGraphicFramePr>
+          <p:cNvPr id="2" name="Table 1">
+            <a:extLst>
+              <a:ext uri="{FF2B5EF4-FFF2-40B4-BE49-F238E27FC236}">
+                <a16:creationId xmlns:a16="http://schemas.microsoft.com/office/drawing/2014/main" id="{2ACD2FC1-81D7-40D7-96C4-83747545C575}"/>
+              </a:ext>
+            </a:extLst>
+          </p:cNvPr>
+          <p:cNvGraphicFramePr>
+            <a:graphicFrameLocks noGrp="1"/>
+          </p:cNvGraphicFramePr>
+          <p:nvPr>
+            <p:extLst>
+              <p:ext uri="{D42A27DB-BD31-4B8C-83A1-F6EECF244321}">
+                <p14:modId xmlns:p14="http://schemas.microsoft.com/office/powerpoint/2010/main" val="2367409240"/>
+              </p:ext>
+            </p:extLst>
+          </p:nvPr>
+        </p:nvGraphicFramePr>
+        <p:xfrm>
+          <a:off x="2483774" y="1447994"/>
+          <a:ext cx="6179980" cy="2225040"/>
+        </p:xfrm>
+        <a:graphic>
+          <a:graphicData uri="http://schemas.openxmlformats.org/drawingml/2006/table">
+            <a:tbl>
+              <a:tblPr firstRow="1" bandRow="1">
+                <a:tableStyleId>{7DF18680-E054-41AD-8BC1-D1AEF772440D}</a:tableStyleId>
+              </a:tblPr>
+              <a:tblGrid>
+                <a:gridCol w="1978406">
+                  <a:extLst>
+                    <a:ext uri="{9D8B030D-6E8A-4147-A177-3AD203B41FA5}">
+                      <a16:colId xmlns:a16="http://schemas.microsoft.com/office/drawing/2014/main" val="3374511798"/>
+                    </a:ext>
+                  </a:extLst>
+                </a:gridCol>
+                <a:gridCol w="671449">
+                  <a:extLst>
+                    <a:ext uri="{9D8B030D-6E8A-4147-A177-3AD203B41FA5}">
+                      <a16:colId xmlns:a16="http://schemas.microsoft.com/office/drawing/2014/main" val="2007650479"/>
+                    </a:ext>
+                  </a:extLst>
+                </a:gridCol>
+                <a:gridCol w="1536573">
+                  <a:extLst>
+                    <a:ext uri="{9D8B030D-6E8A-4147-A177-3AD203B41FA5}">
+                      <a16:colId xmlns:a16="http://schemas.microsoft.com/office/drawing/2014/main" val="1443922345"/>
+                    </a:ext>
+                  </a:extLst>
+                </a:gridCol>
+                <a:gridCol w="1993552">
+                  <a:extLst>
+                    <a:ext uri="{9D8B030D-6E8A-4147-A177-3AD203B41FA5}">
+                      <a16:colId xmlns:a16="http://schemas.microsoft.com/office/drawing/2014/main" val="1015195530"/>
+                    </a:ext>
+                  </a:extLst>
+                </a:gridCol>
+              </a:tblGrid>
+              <a:tr h="370840">
+                <a:tc>
+                  <a:txBody>
+                    <a:bodyPr/>
+                    <a:lstStyle/>
+                    <a:p>
+                      <a:pPr algn="l" rtl="0" fontAlgn="ctr"/>
+                      <a:r>
+                        <a:rPr lang="de-DE" sz="1800" b="1" i="0" u="none" strike="noStrike" dirty="0">
+                          <a:solidFill>
+                            <a:srgbClr val="FFFFFF"/>
+                          </a:solidFill>
+                          <a:effectLst/>
+                          <a:latin typeface="Calibri" panose="020F0502020204030204" pitchFamily="34" charset="0"/>
+                        </a:rPr>
+                        <a:t>Aspekt</a:t>
+                      </a:r>
+                    </a:p>
+                  </a:txBody>
+                  <a:tcPr marL="9525" marR="9525" marT="9525" marB="0" anchor="ctr"/>
+                </a:tc>
+                <a:tc>
+                  <a:txBody>
+                    <a:bodyPr/>
+                    <a:lstStyle/>
+                    <a:p>
+                      <a:pPr algn="l" rtl="0" fontAlgn="ctr"/>
+                      <a:r>
+                        <a:rPr lang="de-DE" sz="1800" b="1" i="0" u="none" strike="noStrike">
+                          <a:solidFill>
+                            <a:srgbClr val="FFFFFF"/>
+                          </a:solidFill>
+                          <a:effectLst/>
+                          <a:latin typeface="Calibri" panose="020F0502020204030204" pitchFamily="34" charset="0"/>
+                        </a:rPr>
+                        <a:t>Faktor</a:t>
+                      </a:r>
+                    </a:p>
+                  </a:txBody>
+                  <a:tcPr marL="9525" marR="9525" marT="9525" marB="0" anchor="ctr"/>
+                </a:tc>
+                <a:tc>
+                  <a:txBody>
+                    <a:bodyPr/>
+                    <a:lstStyle/>
+                    <a:p>
+                      <a:pPr algn="l" rtl="0" fontAlgn="ctr"/>
+                      <a:r>
+                        <a:rPr lang="de-DE" sz="1800" b="1" i="0" u="none" strike="noStrike">
+                          <a:solidFill>
+                            <a:srgbClr val="FFFFFF"/>
+                          </a:solidFill>
+                          <a:effectLst/>
+                          <a:latin typeface="Calibri" panose="020F0502020204030204" pitchFamily="34" charset="0"/>
+                        </a:rPr>
+                        <a:t>Altes Verfahren</a:t>
+                      </a:r>
+                    </a:p>
+                  </a:txBody>
+                  <a:tcPr marL="9525" marR="9525" marT="9525" marB="0" anchor="ctr"/>
+                </a:tc>
+                <a:tc>
+                  <a:txBody>
+                    <a:bodyPr/>
+                    <a:lstStyle/>
+                    <a:p>
+                      <a:pPr algn="l" rtl="0" fontAlgn="ctr"/>
+                      <a:r>
+                        <a:rPr lang="de-DE" sz="1800" b="1" i="0" u="none" strike="noStrike" dirty="0" err="1">
+                          <a:solidFill>
+                            <a:srgbClr val="FFFFFF"/>
+                          </a:solidFill>
+                          <a:effectLst/>
+                          <a:latin typeface="Calibri" panose="020F0502020204030204" pitchFamily="34" charset="0"/>
+                        </a:rPr>
+                        <a:t>Qes</a:t>
+                      </a:r>
+                      <a:r>
+                        <a:rPr lang="de-DE" sz="1800" b="1" i="0" u="none" strike="noStrike" dirty="0">
+                          <a:solidFill>
+                            <a:srgbClr val="FFFFFF"/>
+                          </a:solidFill>
+                          <a:effectLst/>
+                          <a:latin typeface="Calibri" panose="020F0502020204030204" pitchFamily="34" charset="0"/>
+                        </a:rPr>
+                        <a:t> Export</a:t>
+                      </a:r>
+                    </a:p>
+                  </a:txBody>
+                  <a:tcPr marL="9525" marR="9525" marT="9525" marB="0" anchor="ctr"/>
+                </a:tc>
+                <a:extLst>
+                  <a:ext uri="{0D108BD9-81ED-4DB2-BD59-A6C34878D82A}">
+                    <a16:rowId xmlns:a16="http://schemas.microsoft.com/office/drawing/2014/main" val="3308381985"/>
+                  </a:ext>
+                </a:extLst>
+              </a:tr>
+              <a:tr h="370840">
+                <a:tc>
+                  <a:txBody>
+                    <a:bodyPr/>
+                    <a:lstStyle/>
+                    <a:p>
+                      <a:pPr algn="l" rtl="0" fontAlgn="ctr"/>
+                      <a:r>
+                        <a:rPr lang="de-DE" sz="1800" b="0" i="0" u="none" strike="noStrike" dirty="0">
+                          <a:solidFill>
+                            <a:srgbClr val="000000"/>
+                          </a:solidFill>
+                          <a:effectLst/>
+                          <a:latin typeface="Calibri" panose="020F0502020204030204" pitchFamily="34" charset="0"/>
+                        </a:rPr>
+                        <a:t>Transparenz</a:t>
+                      </a:r>
+                    </a:p>
+                  </a:txBody>
+                  <a:tcPr marL="9525" marR="9525" marT="9525" marB="0" anchor="ctr"/>
+                </a:tc>
+                <a:tc>
+                  <a:txBody>
+                    <a:bodyPr/>
+                    <a:lstStyle/>
+                    <a:p>
+                      <a:pPr algn="l" rtl="0" fontAlgn="ctr"/>
+                      <a:r>
+                        <a:rPr lang="de-DE" sz="1800" b="0" i="0" u="none" strike="noStrike" dirty="0">
+                          <a:solidFill>
+                            <a:srgbClr val="000000"/>
+                          </a:solidFill>
+                          <a:effectLst/>
+                          <a:latin typeface="Calibri" panose="020F0502020204030204" pitchFamily="34" charset="0"/>
+                        </a:rPr>
+                        <a:t>3</a:t>
+                      </a:r>
+                    </a:p>
+                  </a:txBody>
+                  <a:tcPr marL="9525" marR="9525" marT="9525" marB="0" anchor="ctr"/>
+                </a:tc>
+                <a:tc>
+                  <a:txBody>
+                    <a:bodyPr/>
+                    <a:lstStyle/>
+                    <a:p>
+                      <a:pPr algn="l" rtl="0" fontAlgn="ctr"/>
+                      <a:r>
+                        <a:rPr lang="de-DE" sz="1800" b="0" i="0" u="none" strike="noStrike">
+                          <a:solidFill>
+                            <a:srgbClr val="000000"/>
+                          </a:solidFill>
+                          <a:effectLst/>
+                          <a:latin typeface="Calibri" panose="020F0502020204030204" pitchFamily="34" charset="0"/>
+                        </a:rPr>
+                        <a:t>2</a:t>
+                      </a:r>
+                    </a:p>
+                  </a:txBody>
+                  <a:tcPr marL="9525" marR="9525" marT="9525" marB="0" anchor="ctr"/>
+                </a:tc>
+                <a:tc>
+                  <a:txBody>
+                    <a:bodyPr/>
+                    <a:lstStyle/>
+                    <a:p>
+                      <a:pPr algn="l" rtl="0" fontAlgn="ctr"/>
+                      <a:r>
+                        <a:rPr lang="de-DE" sz="1800" b="0" i="0" u="none" strike="noStrike" dirty="0">
+                          <a:solidFill>
+                            <a:srgbClr val="000000"/>
+                          </a:solidFill>
+                          <a:effectLst/>
+                          <a:latin typeface="Calibri" panose="020F0502020204030204" pitchFamily="34" charset="0"/>
+                        </a:rPr>
+                        <a:t>9</a:t>
+                      </a:r>
+                    </a:p>
+                  </a:txBody>
+                  <a:tcPr marL="9525" marR="9525" marT="9525" marB="0" anchor="ctr"/>
+                </a:tc>
+                <a:extLst>
+                  <a:ext uri="{0D108BD9-81ED-4DB2-BD59-A6C34878D82A}">
+                    <a16:rowId xmlns:a16="http://schemas.microsoft.com/office/drawing/2014/main" val="2332832005"/>
+                  </a:ext>
+                </a:extLst>
+              </a:tr>
+              <a:tr h="370840">
+                <a:tc>
+                  <a:txBody>
+                    <a:bodyPr/>
+                    <a:lstStyle/>
+                    <a:p>
+                      <a:pPr algn="l" rtl="0" fontAlgn="ctr"/>
+                      <a:r>
+                        <a:rPr lang="de-DE" sz="1800" b="0" i="0" u="none" strike="noStrike" dirty="0">
+                          <a:solidFill>
+                            <a:srgbClr val="000000"/>
+                          </a:solidFill>
+                          <a:effectLst/>
+                          <a:latin typeface="Calibri" panose="020F0502020204030204" pitchFamily="34" charset="0"/>
+                        </a:rPr>
+                        <a:t>Nutzbarkeit</a:t>
+                      </a:r>
+                    </a:p>
+                  </a:txBody>
+                  <a:tcPr marL="9525" marR="9525" marT="9525" marB="0" anchor="ctr"/>
+                </a:tc>
+                <a:tc>
+                  <a:txBody>
+                    <a:bodyPr/>
+                    <a:lstStyle/>
+                    <a:p>
+                      <a:pPr algn="l" rtl="0" fontAlgn="ctr"/>
+                      <a:r>
+                        <a:rPr lang="de-DE" sz="1800" b="0" i="0" u="none" strike="noStrike">
+                          <a:solidFill>
+                            <a:srgbClr val="000000"/>
+                          </a:solidFill>
+                          <a:effectLst/>
+                          <a:latin typeface="Calibri" panose="020F0502020204030204" pitchFamily="34" charset="0"/>
+                        </a:rPr>
+                        <a:t>3</a:t>
+                      </a:r>
+                    </a:p>
+                  </a:txBody>
+                  <a:tcPr marL="9525" marR="9525" marT="9525" marB="0" anchor="ctr"/>
+                </a:tc>
+                <a:tc>
+                  <a:txBody>
+                    <a:bodyPr/>
+                    <a:lstStyle/>
+                    <a:p>
+                      <a:pPr algn="l" rtl="0" fontAlgn="ctr"/>
+                      <a:r>
+                        <a:rPr lang="de-DE" sz="1800" b="0" i="0" u="none" strike="noStrike">
+                          <a:solidFill>
+                            <a:srgbClr val="000000"/>
+                          </a:solidFill>
+                          <a:effectLst/>
+                          <a:latin typeface="Calibri" panose="020F0502020204030204" pitchFamily="34" charset="0"/>
+                        </a:rPr>
+                        <a:t>2</a:t>
+                      </a:r>
+                    </a:p>
+                  </a:txBody>
+                  <a:tcPr marL="9525" marR="9525" marT="9525" marB="0" anchor="ctr"/>
+                </a:tc>
+                <a:tc>
+                  <a:txBody>
+                    <a:bodyPr/>
+                    <a:lstStyle/>
+                    <a:p>
+                      <a:pPr algn="l" rtl="0" fontAlgn="ctr"/>
+                      <a:r>
+                        <a:rPr lang="de-DE" sz="1800" b="0" i="0" u="none" strike="noStrike" dirty="0">
+                          <a:solidFill>
+                            <a:srgbClr val="000000"/>
+                          </a:solidFill>
+                          <a:effectLst/>
+                          <a:latin typeface="Calibri" panose="020F0502020204030204" pitchFamily="34" charset="0"/>
+                        </a:rPr>
+                        <a:t>10</a:t>
+                      </a:r>
+                    </a:p>
+                  </a:txBody>
+                  <a:tcPr marL="9525" marR="9525" marT="9525" marB="0" anchor="ctr"/>
+                </a:tc>
+                <a:extLst>
+                  <a:ext uri="{0D108BD9-81ED-4DB2-BD59-A6C34878D82A}">
+                    <a16:rowId xmlns:a16="http://schemas.microsoft.com/office/drawing/2014/main" val="812576843"/>
+                  </a:ext>
+                </a:extLst>
+              </a:tr>
+              <a:tr h="370840">
+                <a:tc>
+                  <a:txBody>
+                    <a:bodyPr/>
+                    <a:lstStyle/>
+                    <a:p>
+                      <a:pPr algn="l" rtl="0" fontAlgn="ctr"/>
+                      <a:r>
+                        <a:rPr lang="de-DE" sz="1800" b="0" i="0" u="none" strike="noStrike" dirty="0">
+                          <a:solidFill>
+                            <a:srgbClr val="000000"/>
+                          </a:solidFill>
+                          <a:effectLst/>
+                          <a:latin typeface="Calibri" panose="020F0502020204030204" pitchFamily="34" charset="0"/>
+                        </a:rPr>
+                        <a:t>Nutzerfreundlichkeit</a:t>
+                      </a:r>
+                    </a:p>
+                  </a:txBody>
+                  <a:tcPr marL="9525" marR="9525" marT="9525" marB="0" anchor="ctr"/>
+                </a:tc>
+                <a:tc>
+                  <a:txBody>
+                    <a:bodyPr/>
+                    <a:lstStyle/>
+                    <a:p>
+                      <a:pPr algn="l" rtl="0" fontAlgn="ctr"/>
+                      <a:r>
+                        <a:rPr lang="de-DE" sz="1800" b="0" i="0" u="none" strike="noStrike" dirty="0">
+                          <a:solidFill>
+                            <a:srgbClr val="000000"/>
+                          </a:solidFill>
+                          <a:effectLst/>
+                          <a:latin typeface="Calibri" panose="020F0502020204030204" pitchFamily="34" charset="0"/>
+                        </a:rPr>
+                        <a:t>2</a:t>
+                      </a:r>
+                    </a:p>
+                  </a:txBody>
+                  <a:tcPr marL="9525" marR="9525" marT="9525" marB="0" anchor="ctr"/>
+                </a:tc>
+                <a:tc>
+                  <a:txBody>
+                    <a:bodyPr/>
+                    <a:lstStyle/>
+                    <a:p>
+                      <a:pPr algn="l" rtl="0" fontAlgn="ctr"/>
+                      <a:r>
+                        <a:rPr lang="de-DE" sz="1800" b="0" i="0" u="none" strike="noStrike" dirty="0">
+                          <a:solidFill>
+                            <a:srgbClr val="000000"/>
+                          </a:solidFill>
+                          <a:effectLst/>
+                          <a:latin typeface="Calibri" panose="020F0502020204030204" pitchFamily="34" charset="0"/>
+                        </a:rPr>
+                        <a:t>5</a:t>
+                      </a:r>
+                    </a:p>
+                  </a:txBody>
+                  <a:tcPr marL="9525" marR="9525" marT="9525" marB="0" anchor="ctr"/>
+                </a:tc>
+                <a:tc>
+                  <a:txBody>
+                    <a:bodyPr/>
+                    <a:lstStyle/>
+                    <a:p>
+                      <a:pPr algn="l" rtl="0" fontAlgn="ctr"/>
+                      <a:r>
+                        <a:rPr lang="de-DE" sz="1800" b="0" i="0" u="none" strike="noStrike" dirty="0">
+                          <a:solidFill>
+                            <a:srgbClr val="000000"/>
+                          </a:solidFill>
+                          <a:effectLst/>
+                          <a:latin typeface="Calibri" panose="020F0502020204030204" pitchFamily="34" charset="0"/>
+                        </a:rPr>
+                        <a:t>4</a:t>
+                      </a:r>
+                    </a:p>
+                  </a:txBody>
+                  <a:tcPr marL="9525" marR="9525" marT="9525" marB="0" anchor="ctr"/>
+                </a:tc>
+                <a:extLst>
+                  <a:ext uri="{0D108BD9-81ED-4DB2-BD59-A6C34878D82A}">
+                    <a16:rowId xmlns:a16="http://schemas.microsoft.com/office/drawing/2014/main" val="1961179902"/>
+                  </a:ext>
+                </a:extLst>
+              </a:tr>
+              <a:tr h="370840">
+                <a:tc>
+                  <a:txBody>
+                    <a:bodyPr/>
+                    <a:lstStyle/>
+                    <a:p>
+                      <a:pPr algn="l" rtl="0" fontAlgn="ctr"/>
+                      <a:r>
+                        <a:rPr lang="de-DE" sz="1800" b="0" i="0" u="none" strike="noStrike" dirty="0">
+                          <a:solidFill>
+                            <a:srgbClr val="000000"/>
+                          </a:solidFill>
+                          <a:effectLst/>
+                          <a:latin typeface="Calibri" panose="020F0502020204030204" pitchFamily="34" charset="0"/>
+                        </a:rPr>
+                        <a:t>Verfügbarkeit</a:t>
+                      </a:r>
+                    </a:p>
+                  </a:txBody>
+                  <a:tcPr marL="9525" marR="9525" marT="9525" marB="0" anchor="ctr"/>
+                </a:tc>
+                <a:tc>
+                  <a:txBody>
+                    <a:bodyPr/>
+                    <a:lstStyle/>
+                    <a:p>
+                      <a:pPr algn="l" rtl="0" fontAlgn="ctr"/>
+                      <a:r>
+                        <a:rPr lang="de-DE" sz="1800" b="0" i="0" u="none" strike="noStrike" dirty="0">
+                          <a:solidFill>
+                            <a:srgbClr val="000000"/>
+                          </a:solidFill>
+                          <a:effectLst/>
+                          <a:latin typeface="Calibri" panose="020F0502020204030204" pitchFamily="34" charset="0"/>
+                        </a:rPr>
+                        <a:t>5</a:t>
+                      </a:r>
+                    </a:p>
+                  </a:txBody>
+                  <a:tcPr marL="9525" marR="9525" marT="9525" marB="0" anchor="ctr"/>
+                </a:tc>
+                <a:tc>
+                  <a:txBody>
+                    <a:bodyPr/>
+                    <a:lstStyle/>
+                    <a:p>
+                      <a:pPr algn="l" rtl="0" fontAlgn="ctr"/>
+                      <a:r>
+                        <a:rPr lang="de-DE" sz="1800" b="0" i="0" u="none" strike="noStrike" dirty="0">
+                          <a:solidFill>
+                            <a:srgbClr val="000000"/>
+                          </a:solidFill>
+                          <a:effectLst/>
+                          <a:latin typeface="Calibri" panose="020F0502020204030204" pitchFamily="34" charset="0"/>
+                        </a:rPr>
+                        <a:t>1</a:t>
+                      </a:r>
+                    </a:p>
+                  </a:txBody>
+                  <a:tcPr marL="9525" marR="9525" marT="9525" marB="0" anchor="ctr"/>
+                </a:tc>
+                <a:tc>
+                  <a:txBody>
+                    <a:bodyPr/>
+                    <a:lstStyle/>
+                    <a:p>
+                      <a:pPr algn="l" rtl="0" fontAlgn="ctr"/>
+                      <a:r>
+                        <a:rPr lang="de-DE" sz="1800" b="0" i="0" u="none" strike="noStrike" dirty="0">
+                          <a:solidFill>
+                            <a:srgbClr val="000000"/>
+                          </a:solidFill>
+                          <a:effectLst/>
+                          <a:latin typeface="Calibri" panose="020F0502020204030204" pitchFamily="34" charset="0"/>
+                        </a:rPr>
+                        <a:t>9</a:t>
+                      </a:r>
+                    </a:p>
+                  </a:txBody>
+                  <a:tcPr marL="9525" marR="9525" marT="9525" marB="0" anchor="ctr"/>
+                </a:tc>
+                <a:extLst>
+                  <a:ext uri="{0D108BD9-81ED-4DB2-BD59-A6C34878D82A}">
+                    <a16:rowId xmlns:a16="http://schemas.microsoft.com/office/drawing/2014/main" val="4094347200"/>
+                  </a:ext>
+                </a:extLst>
+              </a:tr>
+              <a:tr h="370840">
+                <a:tc>
+                  <a:txBody>
+                    <a:bodyPr/>
+                    <a:lstStyle/>
+                    <a:p>
+                      <a:pPr algn="l" rtl="0" fontAlgn="ctr"/>
+                      <a:r>
+                        <a:rPr lang="de-DE" sz="1800" b="0" i="0" u="none" strike="noStrike">
+                          <a:solidFill>
+                            <a:srgbClr val="000000"/>
+                          </a:solidFill>
+                          <a:effectLst/>
+                          <a:latin typeface="Calibri" panose="020F0502020204030204" pitchFamily="34" charset="0"/>
+                        </a:rPr>
+                        <a:t>Summe</a:t>
+                      </a:r>
+                    </a:p>
+                  </a:txBody>
+                  <a:tcPr marL="9525" marR="9525" marT="9525" marB="0" anchor="ctr"/>
+                </a:tc>
+                <a:tc>
+                  <a:txBody>
+                    <a:bodyPr/>
+                    <a:lstStyle/>
+                    <a:p>
+                      <a:pPr algn="l" fontAlgn="t"/>
+                      <a:r>
+                        <a:rPr lang="de-DE" sz="1800" b="0" i="0" u="none" strike="noStrike">
+                          <a:solidFill>
+                            <a:srgbClr val="000000"/>
+                          </a:solidFill>
+                          <a:effectLst/>
+                          <a:latin typeface="Arial" panose="020B0604020202020204" pitchFamily="34" charset="0"/>
+                        </a:rPr>
+                        <a:t> </a:t>
+                      </a:r>
+                    </a:p>
+                  </a:txBody>
+                  <a:tcPr marL="9525" marR="9525" marT="9525" marB="0"/>
+                </a:tc>
+                <a:tc>
+                  <a:txBody>
+                    <a:bodyPr/>
+                    <a:lstStyle/>
+                    <a:p>
+                      <a:pPr algn="l" rtl="0" fontAlgn="ctr"/>
+                      <a:r>
+                        <a:rPr lang="de-DE" sz="1800" b="0" i="0" u="none" strike="noStrike">
+                          <a:solidFill>
+                            <a:srgbClr val="000000"/>
+                          </a:solidFill>
+                          <a:effectLst/>
+                          <a:latin typeface="Calibri" panose="020F0502020204030204" pitchFamily="34" charset="0"/>
+                        </a:rPr>
+                        <a:t>23</a:t>
+                      </a:r>
+                    </a:p>
+                  </a:txBody>
+                  <a:tcPr marL="9525" marR="9525" marT="9525" marB="0" anchor="ctr"/>
+                </a:tc>
+                <a:tc>
+                  <a:txBody>
+                    <a:bodyPr/>
+                    <a:lstStyle/>
+                    <a:p>
+                      <a:pPr algn="l" rtl="0" fontAlgn="ctr"/>
+                      <a:r>
+                        <a:rPr lang="de-DE" sz="1800" b="0" i="0" u="none" strike="noStrike" dirty="0">
+                          <a:solidFill>
+                            <a:srgbClr val="000000"/>
+                          </a:solidFill>
+                          <a:effectLst/>
+                          <a:latin typeface="Calibri" panose="020F0502020204030204" pitchFamily="34" charset="0"/>
+                        </a:rPr>
+                        <a:t>97</a:t>
+                      </a:r>
+                    </a:p>
+                  </a:txBody>
+                  <a:tcPr marL="9525" marR="9525" marT="9525" marB="0" anchor="ctr"/>
+                </a:tc>
+                <a:extLst>
+                  <a:ext uri="{0D108BD9-81ED-4DB2-BD59-A6C34878D82A}">
+                    <a16:rowId xmlns:a16="http://schemas.microsoft.com/office/drawing/2014/main" val="72276465"/>
+                  </a:ext>
+                </a:extLst>
+              </a:tr>
+            </a:tbl>
+          </a:graphicData>
+        </a:graphic>
+      </p:graphicFrame>
     </p:spTree>
     <p:extLst>
       <p:ext uri="{BB962C8B-B14F-4D97-AF65-F5344CB8AC3E}">
-        <p14:creationId xmlns:p14="http://schemas.microsoft.com/office/powerpoint/2010/main" val="1457638166"/>
+        <p14:creationId xmlns:p14="http://schemas.microsoft.com/office/powerpoint/2010/main" val="541094551"/>
       </p:ext>
     </p:extLst>
   </p:cSld>
@@ -19606,19 +21284,6 @@
 </file>
 
 <file path=customXml/item1.xml><?xml version="1.0" encoding="utf-8"?>
-<p:properties xmlns:p="http://schemas.microsoft.com/office/2006/metadata/properties" xmlns:xsi="http://www.w3.org/2001/XMLSchema-instance" xmlns:pc="http://schemas.microsoft.com/office/infopath/2007/PartnerControls">
-  <documentManagement>
-    <Gremium_x0020_intern xmlns="8ec5f598-09a5-4f4d-8ba3-f8504e05b148" xsi:nil="true"/>
-    <_dlc_DocId xmlns="8ec5f598-09a5-4f4d-8ba3-f8504e05b148">GESISDOC-552-21</_dlc_DocId>
-    <_dlc_DocIdUrl xmlns="8ec5f598-09a5-4f4d-8ba3-f8504e05b148">
-      <Url>http://intranet.gesis.intra/pr/Vorlagen/_layouts/15/DocIdRedir.aspx?ID=GESISDOC-552-21</Url>
-      <Description>GESISDOC-552-21</Description>
-    </_dlc_DocIdUrl>
-  </documentManagement>
-</p:properties>
-</file>
-
-<file path=customXml/item2.xml><?xml version="1.0" encoding="utf-8"?>
 <?mso-contentType ?>
 <spe:Receivers xmlns:spe="http://schemas.microsoft.com/sharepoint/events">
   <Receiver>
@@ -19668,7 +21333,29 @@
 </spe:Receivers>
 </file>
 
+<file path=customXml/item2.xml><?xml version="1.0" encoding="utf-8"?>
+<p:properties xmlns:p="http://schemas.microsoft.com/office/2006/metadata/properties" xmlns:xsi="http://www.w3.org/2001/XMLSchema-instance" xmlns:pc="http://schemas.microsoft.com/office/infopath/2007/PartnerControls">
+  <documentManagement>
+    <Gremium_x0020_intern xmlns="8ec5f598-09a5-4f4d-8ba3-f8504e05b148" xsi:nil="true"/>
+    <_dlc_DocId xmlns="8ec5f598-09a5-4f4d-8ba3-f8504e05b148">GESISDOC-552-21</_dlc_DocId>
+    <_dlc_DocIdUrl xmlns="8ec5f598-09a5-4f4d-8ba3-f8504e05b148">
+      <Url>http://intranet.gesis.intra/pr/Vorlagen/_layouts/15/DocIdRedir.aspx?ID=GESISDOC-552-21</Url>
+      <Description>GESISDOC-552-21</Description>
+    </_dlc_DocIdUrl>
+  </documentManagement>
+</p:properties>
+</file>
+
 <file path=customXml/item3.xml><?xml version="1.0" encoding="utf-8"?>
+<?mso-contentType ?>
+<FormTemplates xmlns="http://schemas.microsoft.com/sharepoint/v3/contenttype/forms">
+  <Display>DocumentLibraryForm</Display>
+  <Edit>DocumentLibraryForm</Edit>
+  <New>DocumentLibraryForm</New>
+</FormTemplates>
+</file>
+
+<file path=customXml/item4.xml><?xml version="1.0" encoding="utf-8"?>
 <ct:contentTypeSchema xmlns:ct="http://schemas.microsoft.com/office/2006/metadata/contentType" xmlns:ma="http://schemas.microsoft.com/office/2006/metadata/properties/metaAttributes" ct:_="" ma:_="" ma:contentTypeName="Dokument" ma:contentTypeID="0x010100204F40B82AE1344C92AA2539F9DA2FDA" ma:contentTypeVersion="16" ma:contentTypeDescription="Ein neues Dokument erstellen." ma:contentTypeScope="" ma:versionID="104d8f1f86d5ac4fb0bbf732d0fe5cb2">
   <xsd:schema xmlns:xsd="http://www.w3.org/2001/XMLSchema" xmlns:xs="http://www.w3.org/2001/XMLSchema" xmlns:p="http://schemas.microsoft.com/office/2006/metadata/properties" xmlns:ns2="8ec5f598-09a5-4f4d-8ba3-f8504e05b148" targetNamespace="http://schemas.microsoft.com/office/2006/metadata/properties" ma:root="true" ma:fieldsID="6746b2ef738051857e6d4e1367825187" ns2:_="">
     <xsd:import namespace="8ec5f598-09a5-4f4d-8ba3-f8504e05b148"/>
@@ -19822,16 +21509,15 @@
 </ct:contentTypeSchema>
 </file>
 
-<file path=customXml/item4.xml><?xml version="1.0" encoding="utf-8"?>
-<?mso-contentType ?>
-<FormTemplates xmlns="http://schemas.microsoft.com/sharepoint/v3/contenttype/forms">
-  <Display>DocumentLibraryForm</Display>
-  <Edit>DocumentLibraryForm</Edit>
-  <New>DocumentLibraryForm</New>
-</FormTemplates>
+<file path=customXml/itemProps1.xml><?xml version="1.0" encoding="utf-8"?>
+<ds:datastoreItem xmlns:ds="http://schemas.openxmlformats.org/officeDocument/2006/customXml" ds:itemID="{226F3FF9-422F-45E0-A6AB-77F6EE6152F9}">
+  <ds:schemaRefs>
+    <ds:schemaRef ds:uri="http://schemas.microsoft.com/sharepoint/events"/>
+  </ds:schemaRefs>
+</ds:datastoreItem>
 </file>
 
-<file path=customXml/itemProps1.xml><?xml version="1.0" encoding="utf-8"?>
+<file path=customXml/itemProps2.xml><?xml version="1.0" encoding="utf-8"?>
 <ds:datastoreItem xmlns:ds="http://schemas.openxmlformats.org/officeDocument/2006/customXml" ds:itemID="{86D38C2E-02CC-42D3-9E17-44C09712BF5F}">
   <ds:schemaRefs>
     <ds:schemaRef ds:uri="http://purl.org/dc/dcmitype/"/>
@@ -19847,15 +21533,15 @@
 </ds:datastoreItem>
 </file>
 
-<file path=customXml/itemProps2.xml><?xml version="1.0" encoding="utf-8"?>
-<ds:datastoreItem xmlns:ds="http://schemas.openxmlformats.org/officeDocument/2006/customXml" ds:itemID="{226F3FF9-422F-45E0-A6AB-77F6EE6152F9}">
+<file path=customXml/itemProps3.xml><?xml version="1.0" encoding="utf-8"?>
+<ds:datastoreItem xmlns:ds="http://schemas.openxmlformats.org/officeDocument/2006/customXml" ds:itemID="{B662B3C9-84D1-44B4-980A-A658A0349369}">
   <ds:schemaRefs>
-    <ds:schemaRef ds:uri="http://schemas.microsoft.com/sharepoint/events"/>
+    <ds:schemaRef ds:uri="http://schemas.microsoft.com/sharepoint/v3/contenttype/forms"/>
   </ds:schemaRefs>
 </ds:datastoreItem>
 </file>
 
-<file path=customXml/itemProps3.xml><?xml version="1.0" encoding="utf-8"?>
+<file path=customXml/itemProps4.xml><?xml version="1.0" encoding="utf-8"?>
 <ds:datastoreItem xmlns:ds="http://schemas.openxmlformats.org/officeDocument/2006/customXml" ds:itemID="{730C16CC-765D-45A1-A48A-7EE955B6CBC3}">
   <ds:schemaRefs>
     <ds:schemaRef ds:uri="http://schemas.microsoft.com/office/2006/metadata/contentType"/>
@@ -19871,12 +21557,4 @@
     <ds:schemaRef ds:uri="http://schemas.microsoft.com/internal/obd"/>
   </ds:schemaRefs>
 </ds:datastoreItem>
-</file>
-
-<file path=customXml/itemProps4.xml><?xml version="1.0" encoding="utf-8"?>
-<ds:datastoreItem xmlns:ds="http://schemas.openxmlformats.org/officeDocument/2006/customXml" ds:itemID="{B662B3C9-84D1-44B4-980A-A658A0349369}">
-  <ds:schemaRefs>
-    <ds:schemaRef ds:uri="http://schemas.microsoft.com/sharepoint/v3/contenttype/forms"/>
-  </ds:schemaRefs>
-</ds:datastoreItem>
 </file>
</xml_diff>